<commit_message>
New files created for the revised manuscript & response letter
</commit_message>
<xml_diff>
--- a/Manuscript/Answers to reviewer questions-data edition.pptx
+++ b/Manuscript/Answers to reviewer questions-data edition.pptx
@@ -14,14 +14,15 @@
     <p:sldId id="262" r:id="rId8"/>
     <p:sldId id="263" r:id="rId9"/>
     <p:sldId id="264" r:id="rId10"/>
-    <p:sldId id="265" r:id="rId11"/>
-    <p:sldId id="266" r:id="rId12"/>
-    <p:sldId id="267" r:id="rId13"/>
-    <p:sldId id="268" r:id="rId14"/>
-    <p:sldId id="270" r:id="rId15"/>
-    <p:sldId id="269" r:id="rId16"/>
-    <p:sldId id="271" r:id="rId17"/>
-    <p:sldId id="272" r:id="rId18"/>
+    <p:sldId id="273" r:id="rId11"/>
+    <p:sldId id="265" r:id="rId12"/>
+    <p:sldId id="266" r:id="rId13"/>
+    <p:sldId id="267" r:id="rId14"/>
+    <p:sldId id="268" r:id="rId15"/>
+    <p:sldId id="270" r:id="rId16"/>
+    <p:sldId id="269" r:id="rId17"/>
+    <p:sldId id="271" r:id="rId18"/>
+    <p:sldId id="272" r:id="rId19"/>
   </p:sldIdLst>
   <p:sldSz cx="12192000" cy="6858000"/>
   <p:notesSz cx="6858000" cy="9144000"/>
@@ -120,6 +121,11 @@
       </a:defRPr>
     </a:lvl9pPr>
   </p:defaultTextStyle>
+  <p:extLst>
+    <p:ext uri="{EFAFB233-063F-42B5-8137-9DF3F51BA10A}">
+      <p15:sldGuideLst xmlns:p15="http://schemas.microsoft.com/office/powerpoint/2012/main"/>
+    </p:ext>
+  </p:extLst>
 </p:presentation>
 </file>
 
@@ -295,84 +301,112 @@
               <a:effectLst/>
             </c:spPr>
           </c:dPt>
+          <c:dPt>
+            <c:idx val="11"/>
+            <c:invertIfNegative val="0"/>
+            <c:bubble3D val="0"/>
+            <c:spPr>
+              <a:solidFill>
+                <a:schemeClr val="tx1"/>
+              </a:solidFill>
+              <a:ln>
+                <a:solidFill>
+                  <a:sysClr val="windowText" lastClr="000000"/>
+                </a:solidFill>
+              </a:ln>
+              <a:effectLst/>
+            </c:spPr>
+          </c:dPt>
           <c:errBars>
             <c:errBarType val="both"/>
             <c:errValType val="cust"/>
             <c:noEndCap val="0"/>
             <c:plus>
               <c:numRef>
-                <c:f>'Combined results'!$B$11:$K$11</c:f>
+                <c:f>'Combined results'!$B$11:$M$11</c:f>
                 <c:numCache>
                   <c:formatCode>General</c:formatCode>
-                  <c:ptCount val="10"/>
+                  <c:ptCount val="12"/>
                   <c:pt idx="0">
+                    <c:v>0.1719512670827148</c:v>
+                  </c:pt>
+                  <c:pt idx="1">
+                    <c:v>0.24723721251449504</c:v>
+                  </c:pt>
+                  <c:pt idx="2">
                     <c:v>0.2569110228770356</c:v>
                   </c:pt>
-                  <c:pt idx="1">
+                  <c:pt idx="3">
                     <c:v>0.98549330545492764</c:v>
                   </c:pt>
-                  <c:pt idx="2">
+                  <c:pt idx="4">
                     <c:v>0.36730019669421476</c:v>
                   </c:pt>
-                  <c:pt idx="3">
+                  <c:pt idx="5">
                     <c:v>0.4129549092701168</c:v>
                   </c:pt>
-                  <c:pt idx="4">
-                    <c:v>0.4478491377918008</c:v>
-                  </c:pt>
-                  <c:pt idx="5">
-                    <c:v>0.22928438063885082</c:v>
-                  </c:pt>
                   <c:pt idx="6">
+                    <c:v>6.8046674245151012E-2</c:v>
+                  </c:pt>
+                  <c:pt idx="7">
+                    <c:v>0.17818808964337948</c:v>
+                  </c:pt>
+                  <c:pt idx="8">
                     <c:v>0.3748133267731627</c:v>
                   </c:pt>
-                  <c:pt idx="7">
+                  <c:pt idx="9">
                     <c:v>0.20200274275389227</c:v>
                   </c:pt>
-                  <c:pt idx="8">
-                    <c:v>0.33903976307238998</c:v>
-                  </c:pt>
-                  <c:pt idx="9">
-                    <c:v>0.25823105059649071</c:v>
+                  <c:pt idx="10">
+                    <c:v>0.10189360497587063</c:v>
+                  </c:pt>
+                  <c:pt idx="11">
+                    <c:v>0.38727686335441081</c:v>
                   </c:pt>
                 </c:numCache>
               </c:numRef>
             </c:plus>
             <c:minus>
               <c:numRef>
-                <c:f>'Combined results'!$B$11:$K$11</c:f>
+                <c:f>'Combined results'!$B$11:$M$11</c:f>
                 <c:numCache>
                   <c:formatCode>General</c:formatCode>
-                  <c:ptCount val="10"/>
+                  <c:ptCount val="12"/>
                   <c:pt idx="0">
+                    <c:v>0.1719512670827148</c:v>
+                  </c:pt>
+                  <c:pt idx="1">
+                    <c:v>0.24723721251449504</c:v>
+                  </c:pt>
+                  <c:pt idx="2">
                     <c:v>0.2569110228770356</c:v>
                   </c:pt>
-                  <c:pt idx="1">
+                  <c:pt idx="3">
                     <c:v>0.98549330545492764</c:v>
                   </c:pt>
-                  <c:pt idx="2">
+                  <c:pt idx="4">
                     <c:v>0.36730019669421476</c:v>
                   </c:pt>
-                  <c:pt idx="3">
+                  <c:pt idx="5">
                     <c:v>0.4129549092701168</c:v>
                   </c:pt>
-                  <c:pt idx="4">
-                    <c:v>0.4478491377918008</c:v>
-                  </c:pt>
-                  <c:pt idx="5">
-                    <c:v>0.22928438063885082</c:v>
-                  </c:pt>
                   <c:pt idx="6">
+                    <c:v>6.8046674245151012E-2</c:v>
+                  </c:pt>
+                  <c:pt idx="7">
+                    <c:v>0.17818808964337948</c:v>
+                  </c:pt>
+                  <c:pt idx="8">
                     <c:v>0.3748133267731627</c:v>
                   </c:pt>
-                  <c:pt idx="7">
+                  <c:pt idx="9">
                     <c:v>0.20200274275389227</c:v>
                   </c:pt>
-                  <c:pt idx="8">
-                    <c:v>0.33903976307238998</c:v>
-                  </c:pt>
-                  <c:pt idx="9">
-                    <c:v>0.25823105059649071</c:v>
+                  <c:pt idx="10">
+                    <c:v>0.10189360497587063</c:v>
+                  </c:pt>
+                  <c:pt idx="11">
+                    <c:v>0.38727686335441081</c:v>
                   </c:pt>
                 </c:numCache>
               </c:numRef>
@@ -390,9 +424,9 @@
           </c:errBars>
           <c:cat>
             <c:multiLvlStrRef>
-              <c:f>'Combined results'!$B$6:$K$7</c:f>
+              <c:f>'Combined results'!$B$6:$M$7</c:f>
               <c:multiLvlStrCache>
-                <c:ptCount val="10"/>
+                <c:ptCount val="12"/>
                 <c:lvl>
                   <c:pt idx="0">
                     <c:v>Saline</c:v>
@@ -424,21 +458,30 @@
                   <c:pt idx="9">
                     <c:v>MCP230</c:v>
                   </c:pt>
+                  <c:pt idx="10">
+                    <c:v>Saline</c:v>
+                  </c:pt>
+                  <c:pt idx="11">
+                    <c:v>MCP230</c:v>
+                  </c:pt>
                 </c:lvl>
                 <c:lvl>
                   <c:pt idx="0">
+                    <c:v>Ppargc1a</c:v>
+                  </c:pt>
+                  <c:pt idx="2">
                     <c:v>Ppargc1b</c:v>
                   </c:pt>
-                  <c:pt idx="2">
+                  <c:pt idx="4">
                     <c:v>Ppard</c:v>
                   </c:pt>
-                  <c:pt idx="4">
+                  <c:pt idx="6">
                     <c:v>Tfam</c:v>
                   </c:pt>
-                  <c:pt idx="6">
+                  <c:pt idx="8">
                     <c:v>Nrf1</c:v>
                   </c:pt>
-                  <c:pt idx="8">
+                  <c:pt idx="10">
                     <c:v>Nfe2l2</c:v>
                   </c:pt>
                 </c:lvl>
@@ -447,39 +490,45 @@
           </c:cat>
           <c:val>
             <c:numRef>
-              <c:f>'Combined results'!$B$8:$K$8</c:f>
+              <c:f>'Combined results'!$B$8:$M$8</c:f>
               <c:numCache>
                 <c:formatCode>General</c:formatCode>
-                <c:ptCount val="10"/>
+                <c:ptCount val="12"/>
                 <c:pt idx="0">
-                  <c:v>1</c:v>
+                  <c:v>1.0000000000000002</c:v>
                 </c:pt>
                 <c:pt idx="1">
-                  <c:v>3.1491526952225777</c:v>
+                  <c:v>1.0102511061043324</c:v>
                 </c:pt>
                 <c:pt idx="2">
                   <c:v>1</c:v>
                 </c:pt>
                 <c:pt idx="3">
-                  <c:v>1.9173133823510136</c:v>
+                  <c:v>3.1491526952225777</c:v>
                 </c:pt>
                 <c:pt idx="4">
                   <c:v>1</c:v>
                 </c:pt>
                 <c:pt idx="5">
-                  <c:v>0.84980763632419298</c:v>
+                  <c:v>1.9173133823510136</c:v>
                 </c:pt>
                 <c:pt idx="6">
+                  <c:v>1</c:v>
+                </c:pt>
+                <c:pt idx="7">
+                  <c:v>0.98788489500302501</c:v>
+                </c:pt>
+                <c:pt idx="8">
                   <c:v>0.99999999999999978</c:v>
                 </c:pt>
-                <c:pt idx="7">
+                <c:pt idx="9">
                   <c:v>0.81360564972666816</c:v>
                 </c:pt>
-                <c:pt idx="8">
+                <c:pt idx="10">
                   <c:v>1</c:v>
                 </c:pt>
-                <c:pt idx="9">
-                  <c:v>1.0623114431618126</c:v>
+                <c:pt idx="11">
+                  <c:v>1.4001011999495039</c:v>
                 </c:pt>
               </c:numCache>
             </c:numRef>
@@ -495,11 +544,11 @@
         </c:dLbls>
         <c:gapWidth val="32"/>
         <c:overlap val="-27"/>
-        <c:axId val="412065344"/>
-        <c:axId val="412066520"/>
+        <c:axId val="299538856"/>
+        <c:axId val="299535720"/>
       </c:barChart>
       <c:catAx>
-        <c:axId val="412065344"/>
+        <c:axId val="299538856"/>
         <c:scaling>
           <c:orientation val="minMax"/>
         </c:scaling>
@@ -527,7 +576,7 @@
           <a:lstStyle/>
           <a:p>
             <a:pPr>
-              <a:defRPr sz="1200" b="0" i="0" u="none" strike="noStrike" kern="1200" baseline="0">
+              <a:defRPr sz="900" b="0" i="0" u="none" strike="noStrike" kern="1200" baseline="0">
                 <a:solidFill>
                   <a:sysClr val="windowText" lastClr="000000"/>
                 </a:solidFill>
@@ -539,7 +588,7 @@
             <a:endParaRPr lang="en-US"/>
           </a:p>
         </c:txPr>
-        <c:crossAx val="412066520"/>
+        <c:crossAx val="299535720"/>
         <c:crosses val="autoZero"/>
         <c:auto val="1"/>
         <c:lblAlgn val="ctr"/>
@@ -547,7 +596,7 @@
         <c:noMultiLvlLbl val="0"/>
       </c:catAx>
       <c:valAx>
-        <c:axId val="412066520"/>
+        <c:axId val="299535720"/>
         <c:scaling>
           <c:orientation val="minMax"/>
           <c:max val="4.5"/>
@@ -575,7 +624,7 @@
               <a:lstStyle/>
               <a:p>
                 <a:pPr>
-                  <a:defRPr sz="1200" b="0" i="0" u="none" strike="noStrike" kern="1200" baseline="0">
+                  <a:defRPr sz="1000" b="0" i="0" u="none" strike="noStrike" kern="1200" baseline="0">
                     <a:solidFill>
                       <a:schemeClr val="tx1">
                         <a:lumMod val="65000"/>
@@ -588,20 +637,12 @@
                   </a:defRPr>
                 </a:pPr>
                 <a:r>
-                  <a:rPr lang="en-US" sz="1200" dirty="0">
+                  <a:rPr lang="en-US">
                     <a:solidFill>
                       <a:sysClr val="windowText" lastClr="000000"/>
                     </a:solidFill>
                   </a:rPr>
-                  <a:t>Expression relative to </a:t>
-                </a:r>
-                <a:r>
-                  <a:rPr lang="en-US" sz="1200" i="1" dirty="0">
-                    <a:solidFill>
-                      <a:sysClr val="windowText" lastClr="000000"/>
-                    </a:solidFill>
-                  </a:rPr>
-                  <a:t>Rpl13a</a:t>
+                  <a:t>Expression relative to Rpl13a</a:t>
                 </a:r>
               </a:p>
             </c:rich>
@@ -620,7 +661,7 @@
             <a:lstStyle/>
             <a:p>
               <a:pPr>
-                <a:defRPr sz="1200" b="0" i="0" u="none" strike="noStrike" kern="1200" baseline="0">
+                <a:defRPr sz="1000" b="0" i="0" u="none" strike="noStrike" kern="1200" baseline="0">
                   <a:solidFill>
                     <a:schemeClr val="tx1">
                       <a:lumMod val="65000"/>
@@ -652,7 +693,7 @@
           <a:lstStyle/>
           <a:p>
             <a:pPr>
-              <a:defRPr sz="1200" b="0" i="0" u="none" strike="noStrike" kern="1200" baseline="0">
+              <a:defRPr sz="900" b="0" i="0" u="none" strike="noStrike" kern="1200" baseline="0">
                 <a:solidFill>
                   <a:sysClr val="windowText" lastClr="000000"/>
                 </a:solidFill>
@@ -664,7 +705,7 @@
             <a:endParaRPr lang="en-US"/>
           </a:p>
         </c:txPr>
-        <c:crossAx val="412065344"/>
+        <c:crossAx val="299538856"/>
         <c:crosses val="autoZero"/>
         <c:crossBetween val="between"/>
       </c:valAx>
@@ -704,6 +745,359 @@
 </file>
 
 <file path=ppt/charts/chart2.xml><?xml version="1.0" encoding="utf-8"?>
+<c:chartSpace xmlns:c="http://schemas.openxmlformats.org/drawingml/2006/chart" xmlns:a="http://schemas.openxmlformats.org/drawingml/2006/main" xmlns:r="http://schemas.openxmlformats.org/officeDocument/2006/relationships">
+  <c:date1904 val="0"/>
+  <c:lang val="en-US"/>
+  <c:roundedCorners val="0"/>
+  <mc:AlternateContent xmlns:mc="http://schemas.openxmlformats.org/markup-compatibility/2006">
+    <mc:Choice xmlns:c14="http://schemas.microsoft.com/office/drawing/2007/8/2/chart" Requires="c14">
+      <c14:style val="102"/>
+    </mc:Choice>
+    <mc:Fallback>
+      <c:style val="2"/>
+    </mc:Fallback>
+  </mc:AlternateContent>
+  <c:chart>
+    <c:autoTitleDeleted val="1"/>
+    <c:plotArea>
+      <c:layout/>
+      <c:barChart>
+        <c:barDir val="col"/>
+        <c:grouping val="clustered"/>
+        <c:varyColors val="0"/>
+        <c:ser>
+          <c:idx val="0"/>
+          <c:order val="0"/>
+          <c:spPr>
+            <a:solidFill>
+              <a:schemeClr val="accent1"/>
+            </a:solidFill>
+            <a:ln>
+              <a:noFill/>
+            </a:ln>
+            <a:effectLst/>
+          </c:spPr>
+          <c:invertIfNegative val="0"/>
+          <c:dPt>
+            <c:idx val="0"/>
+            <c:invertIfNegative val="0"/>
+            <c:bubble3D val="0"/>
+            <c:spPr>
+              <a:solidFill>
+                <a:schemeClr val="tx1"/>
+              </a:solidFill>
+              <a:ln>
+                <a:solidFill>
+                  <a:sysClr val="windowText" lastClr="000000"/>
+                </a:solidFill>
+              </a:ln>
+              <a:effectLst/>
+            </c:spPr>
+          </c:dPt>
+          <c:dPt>
+            <c:idx val="1"/>
+            <c:invertIfNegative val="0"/>
+            <c:bubble3D val="0"/>
+            <c:spPr>
+              <a:solidFill>
+                <a:schemeClr val="bg1">
+                  <a:lumMod val="50000"/>
+                </a:schemeClr>
+              </a:solidFill>
+              <a:ln>
+                <a:noFill/>
+              </a:ln>
+              <a:effectLst/>
+            </c:spPr>
+          </c:dPt>
+          <c:errBars>
+            <c:errBarType val="both"/>
+            <c:errValType val="cust"/>
+            <c:noEndCap val="0"/>
+            <c:plus>
+              <c:numRef>
+                <c:f>Sheet1!$N$21:$O$21</c:f>
+                <c:numCache>
+                  <c:formatCode>General</c:formatCode>
+                  <c:ptCount val="2"/>
+                  <c:pt idx="0">
+                    <c:v>0.20935659834719195</c:v>
+                  </c:pt>
+                  <c:pt idx="1">
+                    <c:v>0.14154471821951992</c:v>
+                  </c:pt>
+                </c:numCache>
+              </c:numRef>
+            </c:plus>
+            <c:minus>
+              <c:numRef>
+                <c:f>Sheet1!$N$21:$O$21</c:f>
+                <c:numCache>
+                  <c:formatCode>General</c:formatCode>
+                  <c:ptCount val="2"/>
+                  <c:pt idx="0">
+                    <c:v>0.20935659834719195</c:v>
+                  </c:pt>
+                  <c:pt idx="1">
+                    <c:v>0.14154471821951992</c:v>
+                  </c:pt>
+                </c:numCache>
+              </c:numRef>
+            </c:minus>
+            <c:spPr>
+              <a:noFill/>
+              <a:ln w="9525" cap="flat" cmpd="sng" algn="ctr">
+                <a:solidFill>
+                  <a:sysClr val="windowText" lastClr="000000"/>
+                </a:solidFill>
+                <a:round/>
+              </a:ln>
+              <a:effectLst/>
+            </c:spPr>
+          </c:errBars>
+          <c:cat>
+            <c:strRef>
+              <c:f>Sheet1!$N$17:$O$17</c:f>
+              <c:strCache>
+                <c:ptCount val="2"/>
+                <c:pt idx="0">
+                  <c:v>Saline</c:v>
+                </c:pt>
+                <c:pt idx="1">
+                  <c:v>MCP230</c:v>
+                </c:pt>
+              </c:strCache>
+            </c:strRef>
+          </c:cat>
+          <c:val>
+            <c:numRef>
+              <c:f>Sheet1!$N$18:$O$18</c:f>
+              <c:numCache>
+                <c:formatCode>General</c:formatCode>
+                <c:ptCount val="2"/>
+                <c:pt idx="0">
+                  <c:v>1.0000000000000002</c:v>
+                </c:pt>
+                <c:pt idx="1">
+                  <c:v>0.53459794436788721</c:v>
+                </c:pt>
+              </c:numCache>
+            </c:numRef>
+          </c:val>
+        </c:ser>
+        <c:dLbls>
+          <c:showLegendKey val="0"/>
+          <c:showVal val="0"/>
+          <c:showCatName val="0"/>
+          <c:showSerName val="0"/>
+          <c:showPercent val="0"/>
+          <c:showBubbleSize val="0"/>
+        </c:dLbls>
+        <c:gapWidth val="66"/>
+        <c:overlap val="-27"/>
+        <c:axId val="299636744"/>
+        <c:axId val="299635568"/>
+      </c:barChart>
+      <c:catAx>
+        <c:axId val="299636744"/>
+        <c:scaling>
+          <c:orientation val="minMax"/>
+        </c:scaling>
+        <c:delete val="0"/>
+        <c:axPos val="b"/>
+        <c:numFmt formatCode="General" sourceLinked="1"/>
+        <c:majorTickMark val="none"/>
+        <c:minorTickMark val="none"/>
+        <c:tickLblPos val="nextTo"/>
+        <c:spPr>
+          <a:noFill/>
+          <a:ln w="9525" cap="flat" cmpd="sng" algn="ctr">
+            <a:solidFill>
+              <a:schemeClr val="tx1">
+                <a:lumMod val="15000"/>
+                <a:lumOff val="85000"/>
+              </a:schemeClr>
+            </a:solidFill>
+            <a:round/>
+          </a:ln>
+          <a:effectLst/>
+        </c:spPr>
+        <c:txPr>
+          <a:bodyPr rot="-60000000" spcFirstLastPara="1" vertOverflow="ellipsis" vert="horz" wrap="square" anchor="ctr" anchorCtr="1"/>
+          <a:lstStyle/>
+          <a:p>
+            <a:pPr>
+              <a:defRPr sz="1200" b="0" i="0" u="none" strike="noStrike" kern="1200" baseline="0">
+                <a:solidFill>
+                  <a:sysClr val="windowText" lastClr="000000"/>
+                </a:solidFill>
+                <a:latin typeface="+mn-lt"/>
+                <a:ea typeface="+mn-ea"/>
+                <a:cs typeface="+mn-cs"/>
+              </a:defRPr>
+            </a:pPr>
+            <a:endParaRPr lang="en-US"/>
+          </a:p>
+        </c:txPr>
+        <c:crossAx val="299635568"/>
+        <c:crosses val="autoZero"/>
+        <c:auto val="1"/>
+        <c:lblAlgn val="ctr"/>
+        <c:lblOffset val="100"/>
+        <c:noMultiLvlLbl val="0"/>
+      </c:catAx>
+      <c:valAx>
+        <c:axId val="299635568"/>
+        <c:scaling>
+          <c:orientation val="minMax"/>
+        </c:scaling>
+        <c:delete val="0"/>
+        <c:axPos val="l"/>
+        <c:majorGridlines>
+          <c:spPr>
+            <a:ln w="9525" cap="flat" cmpd="sng" algn="ctr">
+              <a:solidFill>
+                <a:schemeClr val="tx1">
+                  <a:lumMod val="15000"/>
+                  <a:lumOff val="85000"/>
+                </a:schemeClr>
+              </a:solidFill>
+              <a:round/>
+            </a:ln>
+            <a:effectLst/>
+          </c:spPr>
+        </c:majorGridlines>
+        <c:title>
+          <c:tx>
+            <c:rich>
+              <a:bodyPr rot="-5400000" spcFirstLastPara="1" vertOverflow="ellipsis" vert="horz" wrap="square" anchor="ctr" anchorCtr="1"/>
+              <a:lstStyle/>
+              <a:p>
+                <a:pPr>
+                  <a:defRPr sz="1200" b="0" i="0" u="none" strike="noStrike" kern="1200" baseline="0">
+                    <a:solidFill>
+                      <a:sysClr val="windowText" lastClr="000000"/>
+                    </a:solidFill>
+                    <a:latin typeface="+mn-lt"/>
+                    <a:ea typeface="+mn-ea"/>
+                    <a:cs typeface="+mn-cs"/>
+                  </a:defRPr>
+                </a:pPr>
+                <a:r>
+                  <a:rPr lang="en-US" i="1"/>
+                  <a:t>Ucp1</a:t>
+                </a:r>
+                <a:r>
+                  <a:rPr lang="en-US"/>
+                  <a:t> expression relative to </a:t>
+                </a:r>
+                <a:r>
+                  <a:rPr lang="en-US" i="1"/>
+                  <a:t>Actb</a:t>
+                </a:r>
+              </a:p>
+            </c:rich>
+          </c:tx>
+          <c:layout/>
+          <c:overlay val="0"/>
+          <c:spPr>
+            <a:noFill/>
+            <a:ln>
+              <a:noFill/>
+            </a:ln>
+            <a:effectLst/>
+          </c:spPr>
+          <c:txPr>
+            <a:bodyPr rot="-5400000" spcFirstLastPara="1" vertOverflow="ellipsis" vert="horz" wrap="square" anchor="ctr" anchorCtr="1"/>
+            <a:lstStyle/>
+            <a:p>
+              <a:pPr>
+                <a:defRPr sz="1200" b="0" i="0" u="none" strike="noStrike" kern="1200" baseline="0">
+                  <a:solidFill>
+                    <a:sysClr val="windowText" lastClr="000000"/>
+                  </a:solidFill>
+                  <a:latin typeface="+mn-lt"/>
+                  <a:ea typeface="+mn-ea"/>
+                  <a:cs typeface="+mn-cs"/>
+                </a:defRPr>
+              </a:pPr>
+              <a:endParaRPr lang="en-US"/>
+            </a:p>
+          </c:txPr>
+        </c:title>
+        <c:numFmt formatCode="General" sourceLinked="1"/>
+        <c:majorTickMark val="none"/>
+        <c:minorTickMark val="none"/>
+        <c:tickLblPos val="nextTo"/>
+        <c:spPr>
+          <a:noFill/>
+          <a:ln>
+            <a:noFill/>
+          </a:ln>
+          <a:effectLst/>
+        </c:spPr>
+        <c:txPr>
+          <a:bodyPr rot="-60000000" spcFirstLastPara="1" vertOverflow="ellipsis" vert="horz" wrap="square" anchor="ctr" anchorCtr="1"/>
+          <a:lstStyle/>
+          <a:p>
+            <a:pPr>
+              <a:defRPr sz="1200" b="0" i="0" u="none" strike="noStrike" kern="1200" baseline="0">
+                <a:solidFill>
+                  <a:sysClr val="windowText" lastClr="000000"/>
+                </a:solidFill>
+                <a:latin typeface="+mn-lt"/>
+                <a:ea typeface="+mn-ea"/>
+                <a:cs typeface="+mn-cs"/>
+              </a:defRPr>
+            </a:pPr>
+            <a:endParaRPr lang="en-US"/>
+          </a:p>
+        </c:txPr>
+        <c:crossAx val="299636744"/>
+        <c:crosses val="autoZero"/>
+        <c:crossBetween val="between"/>
+      </c:valAx>
+      <c:spPr>
+        <a:noFill/>
+        <a:ln>
+          <a:noFill/>
+        </a:ln>
+        <a:effectLst/>
+      </c:spPr>
+    </c:plotArea>
+    <c:plotVisOnly val="1"/>
+    <c:dispBlanksAs val="gap"/>
+    <c:showDLblsOverMax val="0"/>
+  </c:chart>
+  <c:spPr>
+    <a:noFill/>
+    <a:ln w="9525" cap="flat" cmpd="sng" algn="ctr">
+      <a:noFill/>
+      <a:round/>
+    </a:ln>
+    <a:effectLst/>
+  </c:spPr>
+  <c:txPr>
+    <a:bodyPr/>
+    <a:lstStyle/>
+    <a:p>
+      <a:pPr>
+        <a:defRPr sz="1200">
+          <a:solidFill>
+            <a:sysClr val="windowText" lastClr="000000"/>
+          </a:solidFill>
+        </a:defRPr>
+      </a:pPr>
+      <a:endParaRPr lang="en-US"/>
+    </a:p>
+  </c:txPr>
+  <c:externalData r:id="rId3">
+    <c:autoUpdate val="0"/>
+  </c:externalData>
+</c:chartSpace>
+</file>
+
+<file path=ppt/charts/chart3.xml><?xml version="1.0" encoding="utf-8"?>
 <c:chartSpace xmlns:c="http://schemas.openxmlformats.org/drawingml/2006/chart" xmlns:a="http://schemas.openxmlformats.org/drawingml/2006/main" xmlns:r="http://schemas.openxmlformats.org/officeDocument/2006/relationships">
   <c:date1904 val="0"/>
   <c:lang val="en-US"/>
@@ -892,16 +1286,16 @@
                     <c:v>0.70757667427341941</c:v>
                   </c:pt>
                   <c:pt idx="2">
-                    <c:v>0.48667566640873611</c:v>
+                    <c:v>0.19836617285998806</c:v>
                   </c:pt>
                   <c:pt idx="3">
-                    <c:v>0.11526242749186526</c:v>
+                    <c:v>0.18565026146543206</c:v>
                   </c:pt>
                   <c:pt idx="4">
-                    <c:v>0.52047270584516536</c:v>
+                    <c:v>0.32175213002194153</c:v>
                   </c:pt>
                   <c:pt idx="5">
-                    <c:v>0.27671772198591815</c:v>
+                    <c:v>0.13944697918811799</c:v>
                   </c:pt>
                   <c:pt idx="6">
                     <c:v>0.27890598398134392</c:v>
@@ -931,16 +1325,16 @@
                     <c:v>0.70757667427341941</c:v>
                   </c:pt>
                   <c:pt idx="2">
-                    <c:v>0.48667566640873611</c:v>
+                    <c:v>0.19836617285998806</c:v>
                   </c:pt>
                   <c:pt idx="3">
-                    <c:v>0.11526242749186526</c:v>
+                    <c:v>0.18565026146543206</c:v>
                   </c:pt>
                   <c:pt idx="4">
-                    <c:v>0.52047270584516536</c:v>
+                    <c:v>0.32175213002194153</c:v>
                   </c:pt>
                   <c:pt idx="5">
-                    <c:v>0.27671772198591815</c:v>
+                    <c:v>0.13944697918811799</c:v>
                   </c:pt>
                   <c:pt idx="6">
                     <c:v>0.27890598398134392</c:v>
@@ -1041,13 +1435,13 @@
                   <c:v>1</c:v>
                 </c:pt>
                 <c:pt idx="3">
-                  <c:v>0.34746474821806989</c:v>
+                  <c:v>0.5673254200814174</c:v>
                 </c:pt>
                 <c:pt idx="4">
-                  <c:v>1</c:v>
+                  <c:v>1.0000000000000002</c:v>
                 </c:pt>
                 <c:pt idx="5">
-                  <c:v>1.3730462572918241</c:v>
+                  <c:v>0.46276193304072516</c:v>
                 </c:pt>
                 <c:pt idx="6">
                   <c:v>0.99999999999999989</c:v>
@@ -1075,11 +1469,11 @@
         </c:dLbls>
         <c:gapWidth val="32"/>
         <c:overlap val="-27"/>
-        <c:axId val="552769352"/>
-        <c:axId val="552766216"/>
+        <c:axId val="299640272"/>
+        <c:axId val="299639488"/>
       </c:barChart>
       <c:catAx>
-        <c:axId val="552769352"/>
+        <c:axId val="299640272"/>
         <c:scaling>
           <c:orientation val="minMax"/>
         </c:scaling>
@@ -1119,7 +1513,7 @@
             <a:endParaRPr lang="en-US"/>
           </a:p>
         </c:txPr>
-        <c:crossAx val="552766216"/>
+        <c:crossAx val="299639488"/>
         <c:crosses val="autoZero"/>
         <c:auto val="1"/>
         <c:lblAlgn val="ctr"/>
@@ -1127,7 +1521,7 @@
         <c:noMultiLvlLbl val="0"/>
       </c:catAx>
       <c:valAx>
-        <c:axId val="552766216"/>
+        <c:axId val="299639488"/>
         <c:scaling>
           <c:orientation val="minMax"/>
         </c:scaling>
@@ -1167,20 +1561,12 @@
                   </a:defRPr>
                 </a:pPr>
                 <a:r>
-                  <a:rPr lang="en-US" dirty="0">
+                  <a:rPr lang="en-US">
                     <a:solidFill>
                       <a:sysClr val="windowText" lastClr="000000"/>
                     </a:solidFill>
                   </a:rPr>
-                  <a:t>Expression relative to </a:t>
-                </a:r>
-                <a:r>
-                  <a:rPr lang="en-US" i="1" dirty="0">
-                    <a:solidFill>
-                      <a:sysClr val="windowText" lastClr="000000"/>
-                    </a:solidFill>
-                  </a:rPr>
-                  <a:t>Rpl13a</a:t>
+                  <a:t>Expression relative to Rpl13a</a:t>
                 </a:r>
               </a:p>
             </c:rich>
@@ -1243,7 +1629,7 @@
             <a:endParaRPr lang="en-US"/>
           </a:p>
         </c:txPr>
-        <c:crossAx val="552769352"/>
+        <c:crossAx val="299640272"/>
         <c:crosses val="autoZero"/>
         <c:crossBetween val="between"/>
       </c:valAx>
@@ -1282,7 +1668,7 @@
 </c:chartSpace>
 </file>
 
-<file path=ppt/charts/chart3.xml><?xml version="1.0" encoding="utf-8"?>
+<file path=ppt/charts/chart4.xml><?xml version="1.0" encoding="utf-8"?>
 <c:chartSpace xmlns:c="http://schemas.openxmlformats.org/drawingml/2006/chart" xmlns:a="http://schemas.openxmlformats.org/drawingml/2006/main" xmlns:r="http://schemas.openxmlformats.org/officeDocument/2006/relationships">
   <c:date1904 val="0"/>
   <c:lang val="en-US"/>
@@ -1308,10 +1694,12 @@
           <c:order val="0"/>
           <c:spPr>
             <a:solidFill>
-              <a:schemeClr val="accent1"/>
+              <a:schemeClr val="tx1"/>
             </a:solidFill>
             <a:ln>
-              <a:noFill/>
+              <a:solidFill>
+                <a:sysClr val="windowText" lastClr="000000"/>
+              </a:solidFill>
             </a:ln>
             <a:effectLst/>
           </c:spPr>
@@ -1322,7 +1710,7 @@
             <c:bubble3D val="0"/>
             <c:spPr>
               <a:solidFill>
-                <a:schemeClr val="tx1"/>
+                <a:schemeClr val="bg1"/>
               </a:solidFill>
               <a:ln>
                 <a:solidFill>
@@ -1333,17 +1721,33 @@
             </c:spPr>
           </c:dPt>
           <c:dPt>
-            <c:idx val="1"/>
+            <c:idx val="2"/>
             <c:invertIfNegative val="0"/>
             <c:bubble3D val="0"/>
             <c:spPr>
               <a:solidFill>
-                <a:schemeClr val="bg1">
-                  <a:lumMod val="50000"/>
-                </a:schemeClr>
+                <a:sysClr val="window" lastClr="FFFFFF"/>
               </a:solidFill>
               <a:ln>
-                <a:noFill/>
+                <a:solidFill>
+                  <a:sysClr val="windowText" lastClr="000000"/>
+                </a:solidFill>
+              </a:ln>
+              <a:effectLst/>
+            </c:spPr>
+          </c:dPt>
+          <c:dPt>
+            <c:idx val="4"/>
+            <c:invertIfNegative val="0"/>
+            <c:bubble3D val="0"/>
+            <c:spPr>
+              <a:solidFill>
+                <a:sysClr val="window" lastClr="FFFFFF"/>
+              </a:solidFill>
+              <a:ln>
+                <a:solidFill>
+                  <a:sysClr val="windowText" lastClr="000000"/>
+                </a:solidFill>
               </a:ln>
               <a:effectLst/>
             </c:spPr>
@@ -1354,30 +1758,54 @@
             <c:noEndCap val="0"/>
             <c:plus>
               <c:numRef>
-                <c:f>Sheet1!$N$21:$O$21</c:f>
+                <c:f>'UCP''s'!$C$41:$H$41</c:f>
                 <c:numCache>
                   <c:formatCode>General</c:formatCode>
-                  <c:ptCount val="2"/>
+                  <c:ptCount val="6"/>
                   <c:pt idx="0">
-                    <c:v>0.20935659834719195</c:v>
+                    <c:v>6.1476399480659798E-3</c:v>
                   </c:pt>
                   <c:pt idx="1">
-                    <c:v>0.14154471821951992</c:v>
+                    <c:v>1.7540670576009398E-2</c:v>
+                  </c:pt>
+                  <c:pt idx="2">
+                    <c:v>1.7891824121109082E-2</c:v>
+                  </c:pt>
+                  <c:pt idx="3">
+                    <c:v>2.8133577562601018E-2</c:v>
+                  </c:pt>
+                  <c:pt idx="4">
+                    <c:v>4.7914222587611697E-3</c:v>
+                  </c:pt>
+                  <c:pt idx="5">
+                    <c:v>4.4842766400406131E-3</c:v>
                   </c:pt>
                 </c:numCache>
               </c:numRef>
             </c:plus>
             <c:minus>
               <c:numRef>
-                <c:f>Sheet1!$N$21:$O$21</c:f>
+                <c:f>'UCP''s'!$C$41:$H$41</c:f>
                 <c:numCache>
                   <c:formatCode>General</c:formatCode>
-                  <c:ptCount val="2"/>
+                  <c:ptCount val="6"/>
                   <c:pt idx="0">
-                    <c:v>0.20935659834719195</c:v>
+                    <c:v>6.1476399480659798E-3</c:v>
                   </c:pt>
                   <c:pt idx="1">
-                    <c:v>0.14154471821951992</c:v>
+                    <c:v>1.7540670576009398E-2</c:v>
+                  </c:pt>
+                  <c:pt idx="2">
+                    <c:v>1.7891824121109082E-2</c:v>
+                  </c:pt>
+                  <c:pt idx="3">
+                    <c:v>2.8133577562601018E-2</c:v>
+                  </c:pt>
+                  <c:pt idx="4">
+                    <c:v>4.7914222587611697E-3</c:v>
+                  </c:pt>
+                  <c:pt idx="5">
+                    <c:v>4.4842766400406131E-3</c:v>
                   </c:pt>
                 </c:numCache>
               </c:numRef>
@@ -1394,30 +1822,67 @@
             </c:spPr>
           </c:errBars>
           <c:cat>
-            <c:strRef>
-              <c:f>Sheet1!$N$17:$O$17</c:f>
-              <c:strCache>
-                <c:ptCount val="2"/>
-                <c:pt idx="0">
-                  <c:v>Saline</c:v>
-                </c:pt>
-                <c:pt idx="1">
-                  <c:v>MCP230</c:v>
-                </c:pt>
-              </c:strCache>
-            </c:strRef>
+            <c:multiLvlStrRef>
+              <c:f>'UCP''s'!$C$22:$H$23</c:f>
+              <c:multiLvlStrCache>
+                <c:ptCount val="6"/>
+                <c:lvl>
+                  <c:pt idx="0">
+                    <c:v>Saline</c:v>
+                  </c:pt>
+                  <c:pt idx="1">
+                    <c:v>MCP230</c:v>
+                  </c:pt>
+                  <c:pt idx="2">
+                    <c:v>Saline</c:v>
+                  </c:pt>
+                  <c:pt idx="3">
+                    <c:v>MCP230</c:v>
+                  </c:pt>
+                  <c:pt idx="4">
+                    <c:v>Saline</c:v>
+                  </c:pt>
+                  <c:pt idx="5">
+                    <c:v>MCP230</c:v>
+                  </c:pt>
+                </c:lvl>
+                <c:lvl>
+                  <c:pt idx="0">
+                    <c:v>Ucp1</c:v>
+                  </c:pt>
+                  <c:pt idx="2">
+                    <c:v>Ucp2</c:v>
+                  </c:pt>
+                  <c:pt idx="4">
+                    <c:v>Ucp3</c:v>
+                  </c:pt>
+                </c:lvl>
+              </c:multiLvlStrCache>
+            </c:multiLvlStrRef>
           </c:cat>
           <c:val>
             <c:numRef>
-              <c:f>Sheet1!$N$18:$O$18</c:f>
+              <c:f>'UCP''s'!$C$38:$H$38</c:f>
               <c:numCache>
                 <c:formatCode>General</c:formatCode>
-                <c:ptCount val="2"/>
+                <c:ptCount val="6"/>
                 <c:pt idx="0">
-                  <c:v>1.0000000000000002</c:v>
+                  <c:v>7.4225321191435092E-3</c:v>
                 </c:pt>
                 <c:pt idx="1">
-                  <c:v>0.53459794436788721</c:v>
+                  <c:v>2.2621762665260618E-2</c:v>
+                </c:pt>
+                <c:pt idx="2">
+                  <c:v>5.183043074669709E-2</c:v>
+                </c:pt>
+                <c:pt idx="3">
+                  <c:v>0.12394278904195263</c:v>
+                </c:pt>
+                <c:pt idx="4">
+                  <c:v>2.4154432127614214E-2</c:v>
+                </c:pt>
+                <c:pt idx="5">
+                  <c:v>1.3703423353626818E-2</c:v>
                 </c:pt>
               </c:numCache>
             </c:numRef>
@@ -1431,13 +1896,13 @@
           <c:showPercent val="0"/>
           <c:showBubbleSize val="0"/>
         </c:dLbls>
-        <c:gapWidth val="66"/>
+        <c:gapWidth val="219"/>
         <c:overlap val="-27"/>
-        <c:axId val="413215128"/>
-        <c:axId val="413215520"/>
+        <c:axId val="241323936"/>
+        <c:axId val="241322760"/>
       </c:barChart>
       <c:catAx>
-        <c:axId val="413215128"/>
+        <c:axId val="241323936"/>
         <c:scaling>
           <c:orientation val="minMax"/>
         </c:scaling>
@@ -1465,7 +1930,7 @@
           <a:lstStyle/>
           <a:p>
             <a:pPr>
-              <a:defRPr sz="1200" b="0" i="0" u="none" strike="noStrike" kern="1200" baseline="0">
+              <a:defRPr sz="900" b="0" i="0" u="none" strike="noStrike" kern="1200" baseline="0">
                 <a:solidFill>
                   <a:sysClr val="windowText" lastClr="000000"/>
                 </a:solidFill>
@@ -1477,7 +1942,7 @@
             <a:endParaRPr lang="en-US"/>
           </a:p>
         </c:txPr>
-        <c:crossAx val="413215520"/>
+        <c:crossAx val="241322760"/>
         <c:crosses val="autoZero"/>
         <c:auto val="1"/>
         <c:lblAlgn val="ctr"/>
@@ -1485,7 +1950,7 @@
         <c:noMultiLvlLbl val="0"/>
       </c:catAx>
       <c:valAx>
-        <c:axId val="413215520"/>
+        <c:axId val="241322760"/>
         <c:scaling>
           <c:orientation val="minMax"/>
         </c:scaling>
@@ -1512,7 +1977,7 @@
               <a:lstStyle/>
               <a:p>
                 <a:pPr>
-                  <a:defRPr sz="1200" b="0" i="0" u="none" strike="noStrike" kern="1200" baseline="0">
+                  <a:defRPr sz="1000" b="0" i="0" u="none" strike="noStrike" kern="1200" baseline="0">
                     <a:solidFill>
                       <a:sysClr val="windowText" lastClr="000000"/>
                     </a:solidFill>
@@ -1522,16 +1987,12 @@
                   </a:defRPr>
                 </a:pPr>
                 <a:r>
-                  <a:rPr lang="en-US" i="1"/>
-                  <a:t>Ucp1</a:t>
-                </a:r>
-                <a:r>
                   <a:rPr lang="en-US"/>
-                  <a:t> expression relative to </a:t>
+                  <a:t>mRNA relative to </a:t>
                 </a:r>
                 <a:r>
                   <a:rPr lang="en-US" i="1"/>
-                  <a:t>Actb</a:t>
+                  <a:t>Rpl13a</a:t>
                 </a:r>
               </a:p>
             </c:rich>
@@ -1550,7 +2011,7 @@
             <a:lstStyle/>
             <a:p>
               <a:pPr>
-                <a:defRPr sz="1200" b="0" i="0" u="none" strike="noStrike" kern="1200" baseline="0">
+                <a:defRPr sz="1000" b="0" i="0" u="none" strike="noStrike" kern="1200" baseline="0">
                   <a:solidFill>
                     <a:sysClr val="windowText" lastClr="000000"/>
                   </a:solidFill>
@@ -1579,7 +2040,7 @@
           <a:lstStyle/>
           <a:p>
             <a:pPr>
-              <a:defRPr sz="1200" b="0" i="0" u="none" strike="noStrike" kern="1200" baseline="0">
+              <a:defRPr sz="900" b="0" i="0" u="none" strike="noStrike" kern="1200" baseline="0">
                 <a:solidFill>
                   <a:sysClr val="windowText" lastClr="000000"/>
                 </a:solidFill>
@@ -1591,7 +2052,7 @@
             <a:endParaRPr lang="en-US"/>
           </a:p>
         </c:txPr>
-        <c:crossAx val="413215128"/>
+        <c:crossAx val="241323936"/>
         <c:crosses val="autoZero"/>
         <c:crossBetween val="between"/>
       </c:valAx>
@@ -1609,9 +2070,8 @@
   </c:chart>
   <c:spPr>
     <a:noFill/>
-    <a:ln w="9525" cap="flat" cmpd="sng" algn="ctr">
+    <a:ln>
       <a:noFill/>
-      <a:round/>
     </a:ln>
     <a:effectLst/>
   </c:spPr>
@@ -1620,7 +2080,7 @@
     <a:lstStyle/>
     <a:p>
       <a:pPr>
-        <a:defRPr sz="1200">
+        <a:defRPr>
           <a:solidFill>
             <a:sysClr val="windowText" lastClr="000000"/>
           </a:solidFill>
@@ -1635,7 +2095,7 @@
 </c:chartSpace>
 </file>
 
-<file path=ppt/charts/chart4.xml><?xml version="1.0" encoding="utf-8"?>
+<file path=ppt/charts/chart5.xml><?xml version="1.0" encoding="utf-8"?>
 <c:chartSpace xmlns:c="http://schemas.openxmlformats.org/drawingml/2006/chart" xmlns:a="http://schemas.openxmlformats.org/drawingml/2006/main" xmlns:r="http://schemas.openxmlformats.org/officeDocument/2006/relationships">
   <c:date1904 val="0"/>
   <c:lang val="en-US"/>
@@ -1680,7 +2140,6 @@
           </a:p>
         </c:rich>
       </c:tx>
-      <c:layout/>
       <c:overlay val="0"/>
       <c:spPr>
         <a:noFill/>
@@ -2141,11 +2600,11 @@
         </c:dLbls>
         <c:gapWidth val="32"/>
         <c:overlap val="-27"/>
-        <c:axId val="413218656"/>
-        <c:axId val="413221792"/>
+        <c:axId val="303309128"/>
+        <c:axId val="303308344"/>
       </c:barChart>
       <c:catAx>
-        <c:axId val="413218656"/>
+        <c:axId val="303309128"/>
         <c:scaling>
           <c:orientation val="minMax"/>
         </c:scaling>
@@ -2185,7 +2644,7 @@
             <a:endParaRPr lang="en-US"/>
           </a:p>
         </c:txPr>
-        <c:crossAx val="413221792"/>
+        <c:crossAx val="303308344"/>
         <c:crosses val="autoZero"/>
         <c:auto val="1"/>
         <c:lblAlgn val="ctr"/>
@@ -2193,7 +2652,7 @@
         <c:noMultiLvlLbl val="0"/>
       </c:catAx>
       <c:valAx>
-        <c:axId val="413221792"/>
+        <c:axId val="303308344"/>
         <c:scaling>
           <c:orientation val="minMax"/>
         </c:scaling>
@@ -2251,7 +2710,6 @@
               </a:p>
             </c:rich>
           </c:tx>
-          <c:layout/>
           <c:overlay val="0"/>
           <c:spPr>
             <a:noFill/>
@@ -2309,7 +2767,7 @@
             <a:endParaRPr lang="en-US"/>
           </a:p>
         </c:txPr>
-        <c:crossAx val="413218656"/>
+        <c:crossAx val="303309128"/>
         <c:crosses val="autoZero"/>
         <c:crossBetween val="between"/>
       </c:valAx>
@@ -2508,6 +2966,46 @@
 </cs:colorStyle>
 </file>
 
+<file path=ppt/charts/colors5.xml><?xml version="1.0" encoding="utf-8"?>
+<cs:colorStyle xmlns:cs="http://schemas.microsoft.com/office/drawing/2012/chartStyle" xmlns:a="http://schemas.openxmlformats.org/drawingml/2006/main" meth="cycle" id="10">
+  <a:schemeClr val="accent1"/>
+  <a:schemeClr val="accent2"/>
+  <a:schemeClr val="accent3"/>
+  <a:schemeClr val="accent4"/>
+  <a:schemeClr val="accent5"/>
+  <a:schemeClr val="accent6"/>
+  <cs:variation/>
+  <cs:variation>
+    <a:lumMod val="60000"/>
+  </cs:variation>
+  <cs:variation>
+    <a:lumMod val="80000"/>
+    <a:lumOff val="20000"/>
+  </cs:variation>
+  <cs:variation>
+    <a:lumMod val="80000"/>
+  </cs:variation>
+  <cs:variation>
+    <a:lumMod val="60000"/>
+    <a:lumOff val="40000"/>
+  </cs:variation>
+  <cs:variation>
+    <a:lumMod val="50000"/>
+  </cs:variation>
+  <cs:variation>
+    <a:lumMod val="70000"/>
+    <a:lumOff val="30000"/>
+  </cs:variation>
+  <cs:variation>
+    <a:lumMod val="70000"/>
+  </cs:variation>
+  <cs:variation>
+    <a:lumMod val="50000"/>
+    <a:lumOff val="50000"/>
+  </cs:variation>
+</cs:colorStyle>
+</file>
+
 <file path=ppt/charts/style1.xml><?xml version="1.0" encoding="utf-8"?>
 <cs:chartStyle xmlns:cs="http://schemas.microsoft.com/office/drawing/2012/chartStyle" xmlns:a="http://schemas.openxmlformats.org/drawingml/2006/main" id="201">
   <cs:axisTitle>
@@ -4018,6 +4516,509 @@
 </file>
 
 <file path=ppt/charts/style4.xml><?xml version="1.0" encoding="utf-8"?>
+<cs:chartStyle xmlns:cs="http://schemas.microsoft.com/office/drawing/2012/chartStyle" xmlns:a="http://schemas.openxmlformats.org/drawingml/2006/main" id="201">
+  <cs:axisTitle>
+    <cs:lnRef idx="0"/>
+    <cs:fillRef idx="0"/>
+    <cs:effectRef idx="0"/>
+    <cs:fontRef idx="minor">
+      <a:schemeClr val="tx1">
+        <a:lumMod val="65000"/>
+        <a:lumOff val="35000"/>
+      </a:schemeClr>
+    </cs:fontRef>
+    <cs:defRPr sz="1000" kern="1200"/>
+  </cs:axisTitle>
+  <cs:categoryAxis>
+    <cs:lnRef idx="0"/>
+    <cs:fillRef idx="0"/>
+    <cs:effectRef idx="0"/>
+    <cs:fontRef idx="minor">
+      <a:schemeClr val="tx1">
+        <a:lumMod val="65000"/>
+        <a:lumOff val="35000"/>
+      </a:schemeClr>
+    </cs:fontRef>
+    <cs:spPr>
+      <a:ln w="9525" cap="flat" cmpd="sng" algn="ctr">
+        <a:solidFill>
+          <a:schemeClr val="tx1">
+            <a:lumMod val="15000"/>
+            <a:lumOff val="85000"/>
+          </a:schemeClr>
+        </a:solidFill>
+        <a:round/>
+      </a:ln>
+    </cs:spPr>
+    <cs:defRPr sz="900" kern="1200"/>
+  </cs:categoryAxis>
+  <cs:chartArea mods="allowNoFillOverride allowNoLineOverride">
+    <cs:lnRef idx="0"/>
+    <cs:fillRef idx="0"/>
+    <cs:effectRef idx="0"/>
+    <cs:fontRef idx="minor">
+      <a:schemeClr val="tx1"/>
+    </cs:fontRef>
+    <cs:spPr>
+      <a:solidFill>
+        <a:schemeClr val="bg1"/>
+      </a:solidFill>
+      <a:ln w="9525" cap="flat" cmpd="sng" algn="ctr">
+        <a:solidFill>
+          <a:schemeClr val="tx1">
+            <a:lumMod val="15000"/>
+            <a:lumOff val="85000"/>
+          </a:schemeClr>
+        </a:solidFill>
+        <a:round/>
+      </a:ln>
+    </cs:spPr>
+    <cs:defRPr sz="1000" kern="1200"/>
+  </cs:chartArea>
+  <cs:dataLabel>
+    <cs:lnRef idx="0"/>
+    <cs:fillRef idx="0"/>
+    <cs:effectRef idx="0"/>
+    <cs:fontRef idx="minor">
+      <a:schemeClr val="tx1">
+        <a:lumMod val="75000"/>
+        <a:lumOff val="25000"/>
+      </a:schemeClr>
+    </cs:fontRef>
+    <cs:defRPr sz="900" kern="1200"/>
+  </cs:dataLabel>
+  <cs:dataLabelCallout>
+    <cs:lnRef idx="0"/>
+    <cs:fillRef idx="0"/>
+    <cs:effectRef idx="0"/>
+    <cs:fontRef idx="minor">
+      <a:schemeClr val="dk1">
+        <a:lumMod val="65000"/>
+        <a:lumOff val="35000"/>
+      </a:schemeClr>
+    </cs:fontRef>
+    <cs:spPr>
+      <a:solidFill>
+        <a:schemeClr val="lt1"/>
+      </a:solidFill>
+      <a:ln>
+        <a:solidFill>
+          <a:schemeClr val="dk1">
+            <a:lumMod val="25000"/>
+            <a:lumOff val="75000"/>
+          </a:schemeClr>
+        </a:solidFill>
+      </a:ln>
+    </cs:spPr>
+    <cs:defRPr sz="900" kern="1200"/>
+    <cs:bodyPr rot="0" spcFirstLastPara="1" vertOverflow="clip" horzOverflow="clip" vert="horz" wrap="square" lIns="36576" tIns="18288" rIns="36576" bIns="18288" anchor="ctr" anchorCtr="1">
+      <a:spAutoFit/>
+    </cs:bodyPr>
+  </cs:dataLabelCallout>
+  <cs:dataPoint>
+    <cs:lnRef idx="0"/>
+    <cs:fillRef idx="1">
+      <cs:styleClr val="auto"/>
+    </cs:fillRef>
+    <cs:effectRef idx="0"/>
+    <cs:fontRef idx="minor">
+      <a:schemeClr val="tx1"/>
+    </cs:fontRef>
+  </cs:dataPoint>
+  <cs:dataPoint3D>
+    <cs:lnRef idx="0"/>
+    <cs:fillRef idx="1">
+      <cs:styleClr val="auto"/>
+    </cs:fillRef>
+    <cs:effectRef idx="0"/>
+    <cs:fontRef idx="minor">
+      <a:schemeClr val="tx1"/>
+    </cs:fontRef>
+  </cs:dataPoint3D>
+  <cs:dataPointLine>
+    <cs:lnRef idx="0">
+      <cs:styleClr val="auto"/>
+    </cs:lnRef>
+    <cs:fillRef idx="1"/>
+    <cs:effectRef idx="0"/>
+    <cs:fontRef idx="minor">
+      <a:schemeClr val="tx1"/>
+    </cs:fontRef>
+    <cs:spPr>
+      <a:ln w="28575" cap="rnd">
+        <a:solidFill>
+          <a:schemeClr val="phClr"/>
+        </a:solidFill>
+        <a:round/>
+      </a:ln>
+    </cs:spPr>
+  </cs:dataPointLine>
+  <cs:dataPointMarker>
+    <cs:lnRef idx="0">
+      <cs:styleClr val="auto"/>
+    </cs:lnRef>
+    <cs:fillRef idx="1">
+      <cs:styleClr val="auto"/>
+    </cs:fillRef>
+    <cs:effectRef idx="0"/>
+    <cs:fontRef idx="minor">
+      <a:schemeClr val="tx1"/>
+    </cs:fontRef>
+    <cs:spPr>
+      <a:ln w="9525">
+        <a:solidFill>
+          <a:schemeClr val="phClr"/>
+        </a:solidFill>
+      </a:ln>
+    </cs:spPr>
+  </cs:dataPointMarker>
+  <cs:dataPointMarkerLayout symbol="circle" size="5"/>
+  <cs:dataPointWireframe>
+    <cs:lnRef idx="0">
+      <cs:styleClr val="auto"/>
+    </cs:lnRef>
+    <cs:fillRef idx="1"/>
+    <cs:effectRef idx="0"/>
+    <cs:fontRef idx="minor">
+      <a:schemeClr val="tx1"/>
+    </cs:fontRef>
+    <cs:spPr>
+      <a:ln w="9525" cap="rnd">
+        <a:solidFill>
+          <a:schemeClr val="phClr"/>
+        </a:solidFill>
+        <a:round/>
+      </a:ln>
+    </cs:spPr>
+  </cs:dataPointWireframe>
+  <cs:dataTable>
+    <cs:lnRef idx="0"/>
+    <cs:fillRef idx="0"/>
+    <cs:effectRef idx="0"/>
+    <cs:fontRef idx="minor">
+      <a:schemeClr val="tx1">
+        <a:lumMod val="65000"/>
+        <a:lumOff val="35000"/>
+      </a:schemeClr>
+    </cs:fontRef>
+    <cs:spPr>
+      <a:noFill/>
+      <a:ln w="9525" cap="flat" cmpd="sng" algn="ctr">
+        <a:solidFill>
+          <a:schemeClr val="tx1">
+            <a:lumMod val="15000"/>
+            <a:lumOff val="85000"/>
+          </a:schemeClr>
+        </a:solidFill>
+        <a:round/>
+      </a:ln>
+    </cs:spPr>
+    <cs:defRPr sz="900" kern="1200"/>
+  </cs:dataTable>
+  <cs:downBar>
+    <cs:lnRef idx="0"/>
+    <cs:fillRef idx="0"/>
+    <cs:effectRef idx="0"/>
+    <cs:fontRef idx="minor">
+      <a:schemeClr val="dk1"/>
+    </cs:fontRef>
+    <cs:spPr>
+      <a:solidFill>
+        <a:schemeClr val="dk1">
+          <a:lumMod val="65000"/>
+          <a:lumOff val="35000"/>
+        </a:schemeClr>
+      </a:solidFill>
+      <a:ln w="9525">
+        <a:solidFill>
+          <a:schemeClr val="tx1">
+            <a:lumMod val="65000"/>
+            <a:lumOff val="35000"/>
+          </a:schemeClr>
+        </a:solidFill>
+      </a:ln>
+    </cs:spPr>
+  </cs:downBar>
+  <cs:dropLine>
+    <cs:lnRef idx="0"/>
+    <cs:fillRef idx="0"/>
+    <cs:effectRef idx="0"/>
+    <cs:fontRef idx="minor">
+      <a:schemeClr val="tx1"/>
+    </cs:fontRef>
+    <cs:spPr>
+      <a:ln w="9525" cap="flat" cmpd="sng" algn="ctr">
+        <a:solidFill>
+          <a:schemeClr val="tx1">
+            <a:lumMod val="35000"/>
+            <a:lumOff val="65000"/>
+          </a:schemeClr>
+        </a:solidFill>
+        <a:round/>
+      </a:ln>
+    </cs:spPr>
+  </cs:dropLine>
+  <cs:errorBar>
+    <cs:lnRef idx="0"/>
+    <cs:fillRef idx="0"/>
+    <cs:effectRef idx="0"/>
+    <cs:fontRef idx="minor">
+      <a:schemeClr val="tx1"/>
+    </cs:fontRef>
+    <cs:spPr>
+      <a:ln w="9525" cap="flat" cmpd="sng" algn="ctr">
+        <a:solidFill>
+          <a:schemeClr val="tx1">
+            <a:lumMod val="65000"/>
+            <a:lumOff val="35000"/>
+          </a:schemeClr>
+        </a:solidFill>
+        <a:round/>
+      </a:ln>
+    </cs:spPr>
+  </cs:errorBar>
+  <cs:floor>
+    <cs:lnRef idx="0"/>
+    <cs:fillRef idx="0"/>
+    <cs:effectRef idx="0"/>
+    <cs:fontRef idx="minor">
+      <a:schemeClr val="tx1"/>
+    </cs:fontRef>
+    <cs:spPr>
+      <a:noFill/>
+      <a:ln>
+        <a:noFill/>
+      </a:ln>
+    </cs:spPr>
+  </cs:floor>
+  <cs:gridlineMajor>
+    <cs:lnRef idx="0"/>
+    <cs:fillRef idx="0"/>
+    <cs:effectRef idx="0"/>
+    <cs:fontRef idx="minor">
+      <a:schemeClr val="tx1"/>
+    </cs:fontRef>
+    <cs:spPr>
+      <a:ln w="9525" cap="flat" cmpd="sng" algn="ctr">
+        <a:solidFill>
+          <a:schemeClr val="tx1">
+            <a:lumMod val="15000"/>
+            <a:lumOff val="85000"/>
+          </a:schemeClr>
+        </a:solidFill>
+        <a:round/>
+      </a:ln>
+    </cs:spPr>
+  </cs:gridlineMajor>
+  <cs:gridlineMinor>
+    <cs:lnRef idx="0"/>
+    <cs:fillRef idx="0"/>
+    <cs:effectRef idx="0"/>
+    <cs:fontRef idx="minor">
+      <a:schemeClr val="tx1"/>
+    </cs:fontRef>
+    <cs:spPr>
+      <a:ln w="9525" cap="flat" cmpd="sng" algn="ctr">
+        <a:solidFill>
+          <a:schemeClr val="tx1">
+            <a:lumMod val="5000"/>
+            <a:lumOff val="95000"/>
+          </a:schemeClr>
+        </a:solidFill>
+        <a:round/>
+      </a:ln>
+    </cs:spPr>
+  </cs:gridlineMinor>
+  <cs:hiLoLine>
+    <cs:lnRef idx="0"/>
+    <cs:fillRef idx="0"/>
+    <cs:effectRef idx="0"/>
+    <cs:fontRef idx="minor">
+      <a:schemeClr val="tx1"/>
+    </cs:fontRef>
+    <cs:spPr>
+      <a:ln w="9525" cap="flat" cmpd="sng" algn="ctr">
+        <a:solidFill>
+          <a:schemeClr val="tx1">
+            <a:lumMod val="75000"/>
+            <a:lumOff val="25000"/>
+          </a:schemeClr>
+        </a:solidFill>
+        <a:round/>
+      </a:ln>
+    </cs:spPr>
+  </cs:hiLoLine>
+  <cs:leaderLine>
+    <cs:lnRef idx="0"/>
+    <cs:fillRef idx="0"/>
+    <cs:effectRef idx="0"/>
+    <cs:fontRef idx="minor">
+      <a:schemeClr val="tx1"/>
+    </cs:fontRef>
+    <cs:spPr>
+      <a:ln w="9525" cap="flat" cmpd="sng" algn="ctr">
+        <a:solidFill>
+          <a:schemeClr val="tx1">
+            <a:lumMod val="35000"/>
+            <a:lumOff val="65000"/>
+          </a:schemeClr>
+        </a:solidFill>
+        <a:round/>
+      </a:ln>
+    </cs:spPr>
+  </cs:leaderLine>
+  <cs:legend>
+    <cs:lnRef idx="0"/>
+    <cs:fillRef idx="0"/>
+    <cs:effectRef idx="0"/>
+    <cs:fontRef idx="minor">
+      <a:schemeClr val="tx1">
+        <a:lumMod val="65000"/>
+        <a:lumOff val="35000"/>
+      </a:schemeClr>
+    </cs:fontRef>
+    <cs:defRPr sz="900" kern="1200"/>
+  </cs:legend>
+  <cs:plotArea mods="allowNoFillOverride allowNoLineOverride">
+    <cs:lnRef idx="0"/>
+    <cs:fillRef idx="0"/>
+    <cs:effectRef idx="0"/>
+    <cs:fontRef idx="minor">
+      <a:schemeClr val="tx1"/>
+    </cs:fontRef>
+  </cs:plotArea>
+  <cs:plotArea3D mods="allowNoFillOverride allowNoLineOverride">
+    <cs:lnRef idx="0"/>
+    <cs:fillRef idx="0"/>
+    <cs:effectRef idx="0"/>
+    <cs:fontRef idx="minor">
+      <a:schemeClr val="tx1"/>
+    </cs:fontRef>
+  </cs:plotArea3D>
+  <cs:seriesAxis>
+    <cs:lnRef idx="0"/>
+    <cs:fillRef idx="0"/>
+    <cs:effectRef idx="0"/>
+    <cs:fontRef idx="minor">
+      <a:schemeClr val="tx1">
+        <a:lumMod val="65000"/>
+        <a:lumOff val="35000"/>
+      </a:schemeClr>
+    </cs:fontRef>
+    <cs:defRPr sz="900" kern="1200"/>
+  </cs:seriesAxis>
+  <cs:seriesLine>
+    <cs:lnRef idx="0"/>
+    <cs:fillRef idx="0"/>
+    <cs:effectRef idx="0"/>
+    <cs:fontRef idx="minor">
+      <a:schemeClr val="tx1"/>
+    </cs:fontRef>
+    <cs:spPr>
+      <a:ln w="9525" cap="flat" cmpd="sng" algn="ctr">
+        <a:solidFill>
+          <a:schemeClr val="tx1">
+            <a:lumMod val="35000"/>
+            <a:lumOff val="65000"/>
+          </a:schemeClr>
+        </a:solidFill>
+        <a:round/>
+      </a:ln>
+    </cs:spPr>
+  </cs:seriesLine>
+  <cs:title>
+    <cs:lnRef idx="0"/>
+    <cs:fillRef idx="0"/>
+    <cs:effectRef idx="0"/>
+    <cs:fontRef idx="minor">
+      <a:schemeClr val="tx1">
+        <a:lumMod val="65000"/>
+        <a:lumOff val="35000"/>
+      </a:schemeClr>
+    </cs:fontRef>
+    <cs:defRPr sz="1400" b="0" kern="1200" spc="0" baseline="0"/>
+  </cs:title>
+  <cs:trendline>
+    <cs:lnRef idx="0">
+      <cs:styleClr val="auto"/>
+    </cs:lnRef>
+    <cs:fillRef idx="0"/>
+    <cs:effectRef idx="0"/>
+    <cs:fontRef idx="minor">
+      <a:schemeClr val="tx1"/>
+    </cs:fontRef>
+    <cs:spPr>
+      <a:ln w="19050" cap="rnd">
+        <a:solidFill>
+          <a:schemeClr val="phClr"/>
+        </a:solidFill>
+        <a:prstDash val="sysDot"/>
+      </a:ln>
+    </cs:spPr>
+  </cs:trendline>
+  <cs:trendlineLabel>
+    <cs:lnRef idx="0"/>
+    <cs:fillRef idx="0"/>
+    <cs:effectRef idx="0"/>
+    <cs:fontRef idx="minor">
+      <a:schemeClr val="tx1">
+        <a:lumMod val="65000"/>
+        <a:lumOff val="35000"/>
+      </a:schemeClr>
+    </cs:fontRef>
+    <cs:defRPr sz="900" kern="1200"/>
+  </cs:trendlineLabel>
+  <cs:upBar>
+    <cs:lnRef idx="0"/>
+    <cs:fillRef idx="0"/>
+    <cs:effectRef idx="0"/>
+    <cs:fontRef idx="minor">
+      <a:schemeClr val="dk1"/>
+    </cs:fontRef>
+    <cs:spPr>
+      <a:solidFill>
+        <a:schemeClr val="lt1"/>
+      </a:solidFill>
+      <a:ln w="9525">
+        <a:solidFill>
+          <a:schemeClr val="tx1">
+            <a:lumMod val="15000"/>
+            <a:lumOff val="85000"/>
+          </a:schemeClr>
+        </a:solidFill>
+      </a:ln>
+    </cs:spPr>
+  </cs:upBar>
+  <cs:valueAxis>
+    <cs:lnRef idx="0"/>
+    <cs:fillRef idx="0"/>
+    <cs:effectRef idx="0"/>
+    <cs:fontRef idx="minor">
+      <a:schemeClr val="tx1">
+        <a:lumMod val="65000"/>
+        <a:lumOff val="35000"/>
+      </a:schemeClr>
+    </cs:fontRef>
+    <cs:defRPr sz="900" kern="1200"/>
+  </cs:valueAxis>
+  <cs:wall>
+    <cs:lnRef idx="0"/>
+    <cs:fillRef idx="0"/>
+    <cs:effectRef idx="0"/>
+    <cs:fontRef idx="minor">
+      <a:schemeClr val="tx1"/>
+    </cs:fontRef>
+    <cs:spPr>
+      <a:noFill/>
+      <a:ln>
+        <a:noFill/>
+      </a:ln>
+    </cs:spPr>
+  </cs:wall>
+</cs:chartStyle>
+</file>
+
+<file path=ppt/charts/style5.xml><?xml version="1.0" encoding="utf-8"?>
 <cs:chartStyle xmlns:cs="http://schemas.microsoft.com/office/drawing/2012/chartStyle" xmlns:a="http://schemas.openxmlformats.org/drawingml/2006/main" id="201">
   <cs:axisTitle>
     <cs:lnRef idx="0"/>
@@ -4651,7 +5652,7 @@
           <a:p>
             <a:fld id="{5A4E0D3B-C874-4149-8BAB-9C8A57DDEFE5}" type="datetimeFigureOut">
               <a:rPr lang="en-US" smtClean="0"/>
-              <a:t>1/25/2016</a:t>
+              <a:t>2/8/2016</a:t>
             </a:fld>
             <a:endParaRPr lang="en-US"/>
           </a:p>
@@ -4821,7 +5822,7 @@
           <a:p>
             <a:fld id="{5A4E0D3B-C874-4149-8BAB-9C8A57DDEFE5}" type="datetimeFigureOut">
               <a:rPr lang="en-US" smtClean="0"/>
-              <a:t>1/25/2016</a:t>
+              <a:t>2/8/2016</a:t>
             </a:fld>
             <a:endParaRPr lang="en-US"/>
           </a:p>
@@ -5001,7 +6002,7 @@
           <a:p>
             <a:fld id="{5A4E0D3B-C874-4149-8BAB-9C8A57DDEFE5}" type="datetimeFigureOut">
               <a:rPr lang="en-US" smtClean="0"/>
-              <a:t>1/25/2016</a:t>
+              <a:t>2/8/2016</a:t>
             </a:fld>
             <a:endParaRPr lang="en-US"/>
           </a:p>
@@ -5171,7 +6172,7 @@
           <a:p>
             <a:fld id="{5A4E0D3B-C874-4149-8BAB-9C8A57DDEFE5}" type="datetimeFigureOut">
               <a:rPr lang="en-US" smtClean="0"/>
-              <a:t>1/25/2016</a:t>
+              <a:t>2/8/2016</a:t>
             </a:fld>
             <a:endParaRPr lang="en-US"/>
           </a:p>
@@ -5417,7 +6418,7 @@
           <a:p>
             <a:fld id="{5A4E0D3B-C874-4149-8BAB-9C8A57DDEFE5}" type="datetimeFigureOut">
               <a:rPr lang="en-US" smtClean="0"/>
-              <a:t>1/25/2016</a:t>
+              <a:t>2/8/2016</a:t>
             </a:fld>
             <a:endParaRPr lang="en-US"/>
           </a:p>
@@ -5649,7 +6650,7 @@
           <a:p>
             <a:fld id="{5A4E0D3B-C874-4149-8BAB-9C8A57DDEFE5}" type="datetimeFigureOut">
               <a:rPr lang="en-US" smtClean="0"/>
-              <a:t>1/25/2016</a:t>
+              <a:t>2/8/2016</a:t>
             </a:fld>
             <a:endParaRPr lang="en-US"/>
           </a:p>
@@ -6016,7 +7017,7 @@
           <a:p>
             <a:fld id="{5A4E0D3B-C874-4149-8BAB-9C8A57DDEFE5}" type="datetimeFigureOut">
               <a:rPr lang="en-US" smtClean="0"/>
-              <a:t>1/25/2016</a:t>
+              <a:t>2/8/2016</a:t>
             </a:fld>
             <a:endParaRPr lang="en-US"/>
           </a:p>
@@ -6134,7 +7135,7 @@
           <a:p>
             <a:fld id="{5A4E0D3B-C874-4149-8BAB-9C8A57DDEFE5}" type="datetimeFigureOut">
               <a:rPr lang="en-US" smtClean="0"/>
-              <a:t>1/25/2016</a:t>
+              <a:t>2/8/2016</a:t>
             </a:fld>
             <a:endParaRPr lang="en-US"/>
           </a:p>
@@ -6229,7 +7230,7 @@
           <a:p>
             <a:fld id="{5A4E0D3B-C874-4149-8BAB-9C8A57DDEFE5}" type="datetimeFigureOut">
               <a:rPr lang="en-US" smtClean="0"/>
-              <a:t>1/25/2016</a:t>
+              <a:t>2/8/2016</a:t>
             </a:fld>
             <a:endParaRPr lang="en-US"/>
           </a:p>
@@ -6506,7 +7507,7 @@
           <a:p>
             <a:fld id="{5A4E0D3B-C874-4149-8BAB-9C8A57DDEFE5}" type="datetimeFigureOut">
               <a:rPr lang="en-US" smtClean="0"/>
-              <a:t>1/25/2016</a:t>
+              <a:t>2/8/2016</a:t>
             </a:fld>
             <a:endParaRPr lang="en-US"/>
           </a:p>
@@ -6759,7 +7760,7 @@
           <a:p>
             <a:fld id="{5A4E0D3B-C874-4149-8BAB-9C8A57DDEFE5}" type="datetimeFigureOut">
               <a:rPr lang="en-US" smtClean="0"/>
-              <a:t>1/25/2016</a:t>
+              <a:t>2/8/2016</a:t>
             </a:fld>
             <a:endParaRPr lang="en-US"/>
           </a:p>
@@ -6972,7 +7973,7 @@
           <a:p>
             <a:fld id="{5A4E0D3B-C874-4149-8BAB-9C8A57DDEFE5}" type="datetimeFigureOut">
               <a:rPr lang="en-US" smtClean="0"/>
-              <a:t>1/25/2016</a:t>
+              <a:t>2/8/2016</a:t>
             </a:fld>
             <a:endParaRPr lang="en-US"/>
           </a:p>
@@ -7409,72 +8410,7 @@
       </p:grpSpPr>
       <p:sp>
         <p:nvSpPr>
-          <p:cNvPr id="3" name="Content Placeholder 2"/>
-          <p:cNvSpPr>
-            <a:spLocks noGrp="1"/>
-          </p:cNvSpPr>
-          <p:nvPr>
-            <p:ph idx="1"/>
-          </p:nvPr>
-        </p:nvSpPr>
-        <p:spPr/>
-        <p:txBody>
-          <a:bodyPr>
-            <a:normAutofit/>
-          </a:bodyPr>
-          <a:lstStyle/>
-          <a:p>
-            <a:r>
-              <a:rPr lang="en-US" sz="2400" dirty="0" smtClean="0">
-                <a:solidFill>
-                  <a:srgbClr val="FF0000"/>
-                </a:solidFill>
-              </a:rPr>
-              <a:t>I am pretty sure we discussed this in the text of the manuscript. </a:t>
-            </a:r>
-            <a:r>
-              <a:rPr lang="en-US" sz="2400" dirty="0" err="1" smtClean="0">
-                <a:solidFill>
-                  <a:srgbClr val="FF0000"/>
-                </a:solidFill>
-              </a:rPr>
-              <a:t>Cabosil</a:t>
-            </a:r>
-            <a:r>
-              <a:rPr lang="en-US" sz="2400" dirty="0" smtClean="0">
-                <a:solidFill>
-                  <a:srgbClr val="FF0000"/>
-                </a:solidFill>
-              </a:rPr>
-              <a:t> only had an effect on RER, which is why all the other data is presented as Saline/MCP230, or Saline &amp; </a:t>
-            </a:r>
-            <a:r>
-              <a:rPr lang="en-US" sz="2400" dirty="0" err="1" smtClean="0">
-                <a:solidFill>
-                  <a:srgbClr val="FF0000"/>
-                </a:solidFill>
-              </a:rPr>
-              <a:t>Cabosil</a:t>
-            </a:r>
-            <a:r>
-              <a:rPr lang="en-US" sz="2400" dirty="0" smtClean="0">
-                <a:solidFill>
-                  <a:srgbClr val="FF0000"/>
-                </a:solidFill>
-              </a:rPr>
-              <a:t>/MCP230. </a:t>
-            </a:r>
-            <a:endParaRPr lang="en-US" sz="2400" dirty="0">
-              <a:solidFill>
-                <a:srgbClr val="FF0000"/>
-              </a:solidFill>
-            </a:endParaRPr>
-          </a:p>
-        </p:txBody>
-      </p:sp>
-      <p:sp>
-        <p:nvSpPr>
-          <p:cNvPr id="4" name="Title 1"/>
+          <p:cNvPr id="2" name="Title 1"/>
           <p:cNvSpPr>
             <a:spLocks noGrp="1"/>
           </p:cNvSpPr>
@@ -7482,60 +8418,139 @@
             <p:ph type="title"/>
           </p:nvPr>
         </p:nvSpPr>
+        <p:spPr/>
+        <p:txBody>
+          <a:bodyPr/>
+          <a:lstStyle/>
+          <a:p>
+            <a:r>
+              <a:rPr lang="en-US" dirty="0" smtClean="0"/>
+              <a:t>Uncoupling proteins</a:t>
+            </a:r>
+            <a:endParaRPr lang="en-US" dirty="0"/>
+          </a:p>
+        </p:txBody>
+      </p:sp>
+      <p:graphicFrame>
+        <p:nvGraphicFramePr>
+          <p:cNvPr id="4" name="Chart 3"/>
+          <p:cNvGraphicFramePr>
+            <a:graphicFrameLocks/>
+          </p:cNvGraphicFramePr>
+          <p:nvPr>
+            <p:extLst>
+              <p:ext uri="{D42A27DB-BD31-4B8C-83A1-F6EECF244321}">
+                <p14:modId xmlns:p14="http://schemas.microsoft.com/office/powerpoint/2010/main" val="1718206948"/>
+              </p:ext>
+            </p:extLst>
+          </p:nvPr>
+        </p:nvGraphicFramePr>
+        <p:xfrm>
+          <a:off x="838200" y="1690688"/>
+          <a:ext cx="6434667" cy="3606800"/>
+        </p:xfrm>
+        <a:graphic>
+          <a:graphicData uri="http://schemas.openxmlformats.org/drawingml/2006/chart">
+            <c:chart xmlns:c="http://schemas.openxmlformats.org/drawingml/2006/chart" xmlns:r="http://schemas.openxmlformats.org/officeDocument/2006/relationships" r:id="rId2"/>
+          </a:graphicData>
+        </a:graphic>
+      </p:graphicFrame>
+      <p:sp>
+        <p:nvSpPr>
+          <p:cNvPr id="5" name="TextBox 4"/>
+          <p:cNvSpPr txBox="1"/>
+          <p:nvPr/>
+        </p:nvSpPr>
         <p:spPr>
           <a:xfrm>
-            <a:off x="838200" y="365125"/>
-            <a:ext cx="10515600" cy="1325563"/>
+            <a:off x="1981200" y="5297488"/>
+            <a:ext cx="999066" cy="369332"/>
           </a:xfrm>
+          <a:prstGeom prst="rect">
+            <a:avLst/>
+          </a:prstGeom>
+          <a:noFill/>
         </p:spPr>
         <p:txBody>
-          <a:bodyPr>
-            <a:normAutofit fontScale="90000"/>
+          <a:bodyPr wrap="square" rtlCol="0">
+            <a:spAutoFit/>
           </a:bodyPr>
           <a:lstStyle/>
           <a:p>
+            <a:pPr algn="ctr"/>
             <a:r>
               <a:rPr lang="en-US" dirty="0" smtClean="0"/>
-              <a:t>Reviewer #2</a:t>
-            </a:r>
-            <a:br>
+              <a:t>p=0.433</a:t>
+            </a:r>
+            <a:endParaRPr lang="en-US" dirty="0"/>
+          </a:p>
+        </p:txBody>
+      </p:sp>
+      <p:sp>
+        <p:nvSpPr>
+          <p:cNvPr id="6" name="TextBox 5"/>
+          <p:cNvSpPr txBox="1"/>
+          <p:nvPr/>
+        </p:nvSpPr>
+        <p:spPr>
+          <a:xfrm>
+            <a:off x="3793067" y="5297488"/>
+            <a:ext cx="999066" cy="369332"/>
+          </a:xfrm>
+          <a:prstGeom prst="rect">
+            <a:avLst/>
+          </a:prstGeom>
+          <a:noFill/>
+        </p:spPr>
+        <p:txBody>
+          <a:bodyPr wrap="square" rtlCol="0">
+            <a:spAutoFit/>
+          </a:bodyPr>
+          <a:lstStyle/>
+          <a:p>
+            <a:pPr algn="ctr"/>
+            <a:r>
+              <a:rPr lang="en-US" dirty="0" smtClean="0">
+                <a:solidFill>
+                  <a:srgbClr val="FF0000"/>
+                </a:solidFill>
+              </a:rPr>
+              <a:t>p=0.048</a:t>
+            </a:r>
+            <a:endParaRPr lang="en-US" dirty="0">
+              <a:solidFill>
+                <a:srgbClr val="FF0000"/>
+              </a:solidFill>
+            </a:endParaRPr>
+          </a:p>
+        </p:txBody>
+      </p:sp>
+      <p:sp>
+        <p:nvSpPr>
+          <p:cNvPr id="7" name="TextBox 6"/>
+          <p:cNvSpPr txBox="1"/>
+          <p:nvPr/>
+        </p:nvSpPr>
+        <p:spPr>
+          <a:xfrm>
+            <a:off x="5706534" y="5297488"/>
+            <a:ext cx="999066" cy="369332"/>
+          </a:xfrm>
+          <a:prstGeom prst="rect">
+            <a:avLst/>
+          </a:prstGeom>
+          <a:noFill/>
+        </p:spPr>
+        <p:txBody>
+          <a:bodyPr wrap="square" rtlCol="0">
+            <a:spAutoFit/>
+          </a:bodyPr>
+          <a:lstStyle/>
+          <a:p>
+            <a:pPr algn="ctr"/>
+            <a:r>
               <a:rPr lang="en-US" dirty="0" smtClean="0"/>
-            </a:br>
-            <a:r>
-              <a:rPr lang="en-US" sz="2000" dirty="0" smtClean="0"/>
-              <a:t>“Based on the RER data – it seems that the </a:t>
-            </a:r>
-            <a:r>
-              <a:rPr lang="en-US" sz="2000" dirty="0" err="1" smtClean="0"/>
-              <a:t>Cabosil</a:t>
-            </a:r>
-            <a:r>
-              <a:rPr lang="en-US" sz="2000" dirty="0" smtClean="0"/>
-              <a:t> control alters energy metabolism independent of the EPFR as the </a:t>
-            </a:r>
-            <a:r>
-              <a:rPr lang="en-US" sz="2000" dirty="0" err="1" smtClean="0"/>
-              <a:t>Cabosil</a:t>
-            </a:r>
-            <a:r>
-              <a:rPr lang="en-US" sz="2000" dirty="0" smtClean="0"/>
-              <a:t> group and the MCP230 group both show increases in fat oxidation (or decreases in carbohydrate oxidation) comparable to saline. Thus, it is pertinent to ensure that the </a:t>
-            </a:r>
-            <a:r>
-              <a:rPr lang="en-US" sz="2000" dirty="0" err="1" smtClean="0"/>
-              <a:t>Cabosil</a:t>
-            </a:r>
-            <a:r>
-              <a:rPr lang="en-US" sz="2000" dirty="0" smtClean="0"/>
-              <a:t> is not a confounding variable. Also, why is the VO2 graph and the ambulatory movement graph labelled as both Saline and </a:t>
-            </a:r>
-            <a:r>
-              <a:rPr lang="en-US" sz="2000" dirty="0" err="1" smtClean="0"/>
-              <a:t>Cabosil</a:t>
-            </a:r>
-            <a:r>
-              <a:rPr lang="en-US" sz="2000" dirty="0" smtClean="0"/>
-              <a:t> while the RER is labeled as 3 groups? It is unclear what is happening here ”</a:t>
+              <a:t>p=0.132</a:t>
             </a:r>
             <a:endParaRPr lang="en-US" dirty="0"/>
           </a:p>
@@ -7544,7 +8559,7 @@
     </p:spTree>
     <p:extLst>
       <p:ext uri="{BB962C8B-B14F-4D97-AF65-F5344CB8AC3E}">
-        <p14:creationId xmlns:p14="http://schemas.microsoft.com/office/powerpoint/2010/main" val="3295116270"/>
+        <p14:creationId xmlns:p14="http://schemas.microsoft.com/office/powerpoint/2010/main" val="724409043"/>
       </p:ext>
     </p:extLst>
   </p:cSld>
@@ -7583,117 +8598,62 @@
         </p:nvSpPr>
         <p:spPr/>
         <p:txBody>
-          <a:bodyPr/>
+          <a:bodyPr>
+            <a:normAutofit/>
+          </a:bodyPr>
           <a:lstStyle/>
           <a:p>
             <a:r>
-              <a:rPr lang="en-US" dirty="0" smtClean="0">
+              <a:rPr lang="en-US" sz="2400" dirty="0" smtClean="0">
                 <a:solidFill>
                   <a:srgbClr val="FF0000"/>
                 </a:solidFill>
               </a:rPr>
-              <a:t>It is not possible to assess mitochondrial activity in freshly isolated mitochondria or </a:t>
-            </a:r>
-            <a:r>
-              <a:rPr lang="en-US" dirty="0" err="1" smtClean="0">
+              <a:t>I am pretty sure we discussed this in the text of the manuscript. </a:t>
+            </a:r>
+            <a:r>
+              <a:rPr lang="en-US" sz="2400" dirty="0" err="1" smtClean="0">
                 <a:solidFill>
                   <a:srgbClr val="FF0000"/>
                 </a:solidFill>
               </a:rPr>
-              <a:t>permeabilized</a:t>
-            </a:r>
-            <a:r>
-              <a:rPr lang="en-US" dirty="0" smtClean="0">
+              <a:t>Cabosil</a:t>
+            </a:r>
+            <a:r>
+              <a:rPr lang="en-US" sz="2400" dirty="0" smtClean="0">
                 <a:solidFill>
                   <a:srgbClr val="FF0000"/>
                 </a:solidFill>
               </a:rPr>
-              <a:t> fibers without repeating the entire study. </a:t>
-            </a:r>
-          </a:p>
-          <a:p>
-            <a:endParaRPr lang="en-US" dirty="0">
+              <a:t> only had an effect on RER, which is why all the other data is presented as Saline/MCP230, or Saline &amp; </a:t>
+            </a:r>
+            <a:r>
+              <a:rPr lang="en-US" sz="2400" dirty="0" err="1" smtClean="0">
+                <a:solidFill>
+                  <a:srgbClr val="FF0000"/>
+                </a:solidFill>
+              </a:rPr>
+              <a:t>Cabosil</a:t>
+            </a:r>
+            <a:r>
+              <a:rPr lang="en-US" sz="2400" dirty="0" smtClean="0">
+                <a:solidFill>
+                  <a:srgbClr val="FF0000"/>
+                </a:solidFill>
+              </a:rPr>
+              <a:t>/MCP230. </a:t>
+            </a:r>
+            <a:endParaRPr lang="en-US" sz="2400" dirty="0">
               <a:solidFill>
                 <a:srgbClr val="FF0000"/>
               </a:solidFill>
             </a:endParaRPr>
           </a:p>
-          <a:p>
-            <a:r>
-              <a:rPr lang="en-US" dirty="0" smtClean="0">
-                <a:solidFill>
-                  <a:srgbClr val="FF0000"/>
-                </a:solidFill>
-              </a:rPr>
-              <a:t>A possible explanation for the reduction in </a:t>
-            </a:r>
-            <a:r>
-              <a:rPr lang="en-US" dirty="0" err="1" smtClean="0">
-                <a:solidFill>
-                  <a:srgbClr val="FF0000"/>
-                </a:solidFill>
-              </a:rPr>
-              <a:t>mtDNA</a:t>
-            </a:r>
-            <a:r>
-              <a:rPr lang="en-US" dirty="0" smtClean="0">
-                <a:solidFill>
-                  <a:srgbClr val="FF0000"/>
-                </a:solidFill>
-              </a:rPr>
-              <a:t>/ reduced mitochondrial activity is </a:t>
-            </a:r>
-            <a:r>
-              <a:rPr lang="en-US" dirty="0" err="1" smtClean="0">
-                <a:solidFill>
-                  <a:srgbClr val="FF0000"/>
-                </a:solidFill>
-              </a:rPr>
-              <a:t>glutathionlyation</a:t>
-            </a:r>
-            <a:r>
-              <a:rPr lang="en-US" dirty="0">
-                <a:solidFill>
-                  <a:srgbClr val="FF0000"/>
-                </a:solidFill>
-              </a:rPr>
-              <a:t> </a:t>
-            </a:r>
-            <a:r>
-              <a:rPr lang="en-US" dirty="0" smtClean="0">
-                <a:solidFill>
-                  <a:srgbClr val="FF0000"/>
-                </a:solidFill>
-              </a:rPr>
-              <a:t>induced by oxidative stress. CI and CV of the respiratory chain and many enzymes of the TCA cycle (including citrate synthase) can by </a:t>
-            </a:r>
-            <a:r>
-              <a:rPr lang="en-US" dirty="0" err="1" smtClean="0">
-                <a:solidFill>
-                  <a:srgbClr val="FF0000"/>
-                </a:solidFill>
-              </a:rPr>
-              <a:t>glutathionylated</a:t>
-            </a:r>
-            <a:r>
-              <a:rPr lang="en-US" dirty="0" smtClean="0">
-                <a:solidFill>
-                  <a:srgbClr val="FF0000"/>
-                </a:solidFill>
-              </a:rPr>
-              <a:t> in order to inhibit activity (and thus reduce endogenous ROS production). Need to find some good references for this. </a:t>
-            </a:r>
-            <a:endParaRPr lang="en-US" dirty="0">
-              <a:solidFill>
-                <a:srgbClr val="FF0000"/>
-              </a:solidFill>
-            </a:endParaRPr>
-          </a:p>
         </p:txBody>
       </p:sp>
       <p:sp>
         <p:nvSpPr>
-          <p:cNvPr id="5" name="Title 1"/>
+          <p:cNvPr id="4" name="Title 1"/>
           <p:cNvSpPr>
             <a:spLocks noGrp="1"/>
           </p:cNvSpPr>
@@ -7722,23 +8682,39 @@
             </a:br>
             <a:r>
               <a:rPr lang="en-US" sz="2000" dirty="0" smtClean="0"/>
-              <a:t>“The fact that mitochondrial protein expression does not correlate with citrate synthase activity is interestingly and should be further addressed. Functional experiments in freshly isolated mitochondrial or </a:t>
+              <a:t>“Based on the RER data – it seems that the </a:t>
             </a:r>
             <a:r>
               <a:rPr lang="en-US" sz="2000" dirty="0" err="1" smtClean="0"/>
-              <a:t>permeabilized</a:t>
+              <a:t>Cabosil</a:t>
             </a:r>
             <a:r>
               <a:rPr lang="en-US" sz="2000" dirty="0" smtClean="0"/>
-              <a:t> </a:t>
+              <a:t> control alters energy metabolism independent of the EPFR as the </a:t>
             </a:r>
             <a:r>
               <a:rPr lang="en-US" sz="2000" dirty="0" err="1" smtClean="0"/>
-              <a:t>myofibres</a:t>
+              <a:t>Cabosil</a:t>
             </a:r>
             <a:r>
               <a:rPr lang="en-US" sz="2000" dirty="0" smtClean="0"/>
-              <a:t> would be important to investigate the functional significance of these differences.”</a:t>
+              <a:t> group and the MCP230 group both show increases in fat oxidation (or decreases in carbohydrate oxidation) comparable to saline. Thus, it is pertinent to ensure that the </a:t>
+            </a:r>
+            <a:r>
+              <a:rPr lang="en-US" sz="2000" dirty="0" err="1" smtClean="0"/>
+              <a:t>Cabosil</a:t>
+            </a:r>
+            <a:r>
+              <a:rPr lang="en-US" sz="2000" dirty="0" smtClean="0"/>
+              <a:t> is not a confounding variable. Also, why is the VO2 graph and the ambulatory movement graph labelled as both Saline and </a:t>
+            </a:r>
+            <a:r>
+              <a:rPr lang="en-US" sz="2000" dirty="0" err="1" smtClean="0"/>
+              <a:t>Cabosil</a:t>
+            </a:r>
+            <a:r>
+              <a:rPr lang="en-US" sz="2000" dirty="0" smtClean="0"/>
+              <a:t> while the RER is labeled as 3 groups? It is unclear what is happening here ”</a:t>
             </a:r>
             <a:endParaRPr lang="en-US" dirty="0"/>
           </a:p>
@@ -7747,7 +8723,7 @@
     </p:spTree>
     <p:extLst>
       <p:ext uri="{BB962C8B-B14F-4D97-AF65-F5344CB8AC3E}">
-        <p14:creationId xmlns:p14="http://schemas.microsoft.com/office/powerpoint/2010/main" val="858728977"/>
+        <p14:creationId xmlns:p14="http://schemas.microsoft.com/office/powerpoint/2010/main" val="3295116270"/>
       </p:ext>
     </p:extLst>
   </p:cSld>
@@ -7795,7 +8771,7 @@
                   <a:srgbClr val="FF0000"/>
                 </a:solidFill>
               </a:rPr>
-              <a:t>Figure 3A y-axis is normal (mg/</a:t>
+              <a:t>It is not possible to assess mitochondrial activity in freshly isolated mitochondria or </a:t>
             </a:r>
             <a:r>
               <a:rPr lang="en-US" dirty="0" err="1" smtClean="0">
@@ -7803,7 +8779,7 @@
                   <a:srgbClr val="FF0000"/>
                 </a:solidFill>
               </a:rPr>
-              <a:t>dL</a:t>
+              <a:t>permeabilized</a:t>
             </a:r>
             <a:r>
               <a:rPr lang="en-US" dirty="0" smtClean="0">
@@ -7811,7 +8787,24 @@
                   <a:srgbClr val="FF0000"/>
                 </a:solidFill>
               </a:rPr>
-              <a:t>), although not metric system (</a:t>
+              <a:t> fibers without repeating the entire study. </a:t>
+            </a:r>
+          </a:p>
+          <a:p>
+            <a:endParaRPr lang="en-US" dirty="0">
+              <a:solidFill>
+                <a:srgbClr val="FF0000"/>
+              </a:solidFill>
+            </a:endParaRPr>
+          </a:p>
+          <a:p>
+            <a:r>
+              <a:rPr lang="en-US" dirty="0" smtClean="0">
+                <a:solidFill>
+                  <a:srgbClr val="FF0000"/>
+                </a:solidFill>
+              </a:rPr>
+              <a:t>A possible explanation for the reduction in </a:t>
             </a:r>
             <a:r>
               <a:rPr lang="en-US" dirty="0" err="1" smtClean="0">
@@ -7819,7 +8812,7 @@
                   <a:srgbClr val="FF0000"/>
                 </a:solidFill>
               </a:rPr>
-              <a:t>mmol</a:t>
+              <a:t>mtDNA</a:t>
             </a:r>
             <a:r>
               <a:rPr lang="en-US" dirty="0" smtClean="0">
@@ -7827,24 +8820,47 @@
                   <a:srgbClr val="FF0000"/>
                 </a:solidFill>
               </a:rPr>
-              <a:t>/L).</a:t>
-            </a:r>
-          </a:p>
-          <a:p>
-            <a:endParaRPr lang="en-US" dirty="0" smtClean="0">
-              <a:solidFill>
-                <a:srgbClr val="FF0000"/>
-              </a:solidFill>
-            </a:endParaRPr>
-          </a:p>
-          <a:p>
+              <a:t>/ reduced mitochondrial activity is </a:t>
+            </a:r>
+            <a:r>
+              <a:rPr lang="en-US" dirty="0" err="1" smtClean="0">
+                <a:solidFill>
+                  <a:srgbClr val="FF0000"/>
+                </a:solidFill>
+              </a:rPr>
+              <a:t>glutathionlyation</a:t>
+            </a:r>
+            <a:r>
+              <a:rPr lang="en-US" dirty="0">
+                <a:solidFill>
+                  <a:srgbClr val="FF0000"/>
+                </a:solidFill>
+              </a:rPr>
+              <a:t> </a:t>
+            </a:r>
             <a:r>
               <a:rPr lang="en-US" dirty="0" smtClean="0">
                 <a:solidFill>
                   <a:srgbClr val="FF0000"/>
                 </a:solidFill>
               </a:rPr>
-              <a:t>Sri/Steph, can you please write a paragraph for the reviewer about the EPFR dose and how the dose used in our study compares to average human exposure?</a:t>
+              <a:t>induced by oxidative stress. CI and CV of the respiratory chain and many enzymes of the TCA cycle (including citrate synthase) can by </a:t>
+            </a:r>
+            <a:r>
+              <a:rPr lang="en-US" dirty="0" err="1" smtClean="0">
+                <a:solidFill>
+                  <a:srgbClr val="FF0000"/>
+                </a:solidFill>
+              </a:rPr>
+              <a:t>glutathionylated</a:t>
+            </a:r>
+            <a:r>
+              <a:rPr lang="en-US" dirty="0" smtClean="0">
+                <a:solidFill>
+                  <a:srgbClr val="FF0000"/>
+                </a:solidFill>
+              </a:rPr>
+              <a:t> in order to inhibit activity (and thus reduce endogenous ROS production). Need to find some good references for this. </a:t>
             </a:r>
             <a:endParaRPr lang="en-US" dirty="0">
               <a:solidFill>
@@ -7856,7 +8872,7 @@
       </p:sp>
       <p:sp>
         <p:nvSpPr>
-          <p:cNvPr id="4" name="Title 1"/>
+          <p:cNvPr id="5" name="Title 1"/>
           <p:cNvSpPr>
             <a:spLocks noGrp="1"/>
           </p:cNvSpPr>
@@ -7872,7 +8888,7 @@
         </p:spPr>
         <p:txBody>
           <a:bodyPr>
-            <a:normAutofit/>
+            <a:normAutofit fontScale="90000"/>
           </a:bodyPr>
           <a:lstStyle/>
           <a:p>
@@ -7885,7 +8901,23 @@
             </a:br>
             <a:r>
               <a:rPr lang="en-US" sz="2000" dirty="0" smtClean="0"/>
-              <a:t>“Figure 3A y-axis is unusual. What is the dose of EPFR compared to how much a human would be exposed to?”</a:t>
+              <a:t>“The fact that mitochondrial protein expression does not correlate with citrate synthase activity is interestingly and should be further addressed. Functional experiments in freshly isolated mitochondrial or </a:t>
+            </a:r>
+            <a:r>
+              <a:rPr lang="en-US" sz="2000" dirty="0" err="1" smtClean="0"/>
+              <a:t>permeabilized</a:t>
+            </a:r>
+            <a:r>
+              <a:rPr lang="en-US" sz="2000" dirty="0" smtClean="0"/>
+              <a:t> </a:t>
+            </a:r>
+            <a:r>
+              <a:rPr lang="en-US" sz="2000" dirty="0" err="1" smtClean="0"/>
+              <a:t>myofibres</a:t>
+            </a:r>
+            <a:r>
+              <a:rPr lang="en-US" sz="2000" dirty="0" smtClean="0"/>
+              <a:t> would be important to investigate the functional significance of these differences.”</a:t>
             </a:r>
             <a:endParaRPr lang="en-US" dirty="0"/>
           </a:p>
@@ -7894,7 +8926,7 @@
     </p:spTree>
     <p:extLst>
       <p:ext uri="{BB962C8B-B14F-4D97-AF65-F5344CB8AC3E}">
-        <p14:creationId xmlns:p14="http://schemas.microsoft.com/office/powerpoint/2010/main" val="2357332609"/>
+        <p14:creationId xmlns:p14="http://schemas.microsoft.com/office/powerpoint/2010/main" val="858728977"/>
       </p:ext>
     </p:extLst>
   </p:cSld>
@@ -7942,7 +8974,7 @@
                   <a:srgbClr val="FF0000"/>
                 </a:solidFill>
               </a:rPr>
-              <a:t>We provide citrate synthase activity, which is functional. It is not possible for us to complete </a:t>
+              <a:t>Figure 3A y-axis is normal (mg/</a:t>
             </a:r>
             <a:r>
               <a:rPr lang="en-US" dirty="0" err="1" smtClean="0">
@@ -7950,7 +8982,7 @@
                   <a:srgbClr val="FF0000"/>
                 </a:solidFill>
               </a:rPr>
-              <a:t>respirometry</a:t>
+              <a:t>dL</a:t>
             </a:r>
             <a:r>
               <a:rPr lang="en-US" dirty="0" smtClean="0">
@@ -7958,17 +8990,41 @@
                   <a:srgbClr val="FF0000"/>
                 </a:solidFill>
               </a:rPr>
-              <a:t> experiments without repeating the study in an entirely new cohort of mice.</a:t>
-            </a:r>
-          </a:p>
-          <a:p>
-            <a:endParaRPr lang="en-US" dirty="0">
+              <a:t>), although not metric system (</a:t>
+            </a:r>
+            <a:r>
+              <a:rPr lang="en-US" dirty="0" err="1" smtClean="0">
+                <a:solidFill>
+                  <a:srgbClr val="FF0000"/>
+                </a:solidFill>
+              </a:rPr>
+              <a:t>mmol</a:t>
+            </a:r>
+            <a:r>
+              <a:rPr lang="en-US" dirty="0" smtClean="0">
+                <a:solidFill>
+                  <a:srgbClr val="FF0000"/>
+                </a:solidFill>
+              </a:rPr>
+              <a:t>/L).</a:t>
+            </a:r>
+          </a:p>
+          <a:p>
+            <a:endParaRPr lang="en-US" dirty="0" smtClean="0">
               <a:solidFill>
                 <a:srgbClr val="FF0000"/>
               </a:solidFill>
             </a:endParaRPr>
           </a:p>
           <a:p>
+            <a:r>
+              <a:rPr lang="en-US" dirty="0" smtClean="0">
+                <a:solidFill>
+                  <a:srgbClr val="FF0000"/>
+                </a:solidFill>
+              </a:rPr>
+              <a:t>Sri/Steph, can you please write a paragraph for the reviewer about the EPFR dose and how the dose used in our study compares to average human exposure?</a:t>
+            </a:r>
             <a:endParaRPr lang="en-US" dirty="0">
               <a:solidFill>
                 <a:srgbClr val="FF0000"/>
@@ -8001,6 +9057,129 @@
           <a:p>
             <a:r>
               <a:rPr lang="en-US" dirty="0" smtClean="0"/>
+              <a:t>Reviewer #2</a:t>
+            </a:r>
+            <a:br>
+              <a:rPr lang="en-US" dirty="0" smtClean="0"/>
+            </a:br>
+            <a:r>
+              <a:rPr lang="en-US" sz="2000" dirty="0" smtClean="0"/>
+              <a:t>“Figure 3A y-axis is unusual. What is the dose of EPFR compared to how much a human would be exposed to?”</a:t>
+            </a:r>
+            <a:endParaRPr lang="en-US" dirty="0"/>
+          </a:p>
+        </p:txBody>
+      </p:sp>
+    </p:spTree>
+    <p:extLst>
+      <p:ext uri="{BB962C8B-B14F-4D97-AF65-F5344CB8AC3E}">
+        <p14:creationId xmlns:p14="http://schemas.microsoft.com/office/powerpoint/2010/main" val="2357332609"/>
+      </p:ext>
+    </p:extLst>
+  </p:cSld>
+  <p:clrMapOvr>
+    <a:masterClrMapping/>
+  </p:clrMapOvr>
+</p:sld>
+</file>
+
+<file path=ppt/slides/slide14.xml><?xml version="1.0" encoding="utf-8"?>
+<p:sld xmlns:a="http://schemas.openxmlformats.org/drawingml/2006/main" xmlns:r="http://schemas.openxmlformats.org/officeDocument/2006/relationships" xmlns:p="http://schemas.openxmlformats.org/presentationml/2006/main">
+  <p:cSld>
+    <p:spTree>
+      <p:nvGrpSpPr>
+        <p:cNvPr id="1" name=""/>
+        <p:cNvGrpSpPr/>
+        <p:nvPr/>
+      </p:nvGrpSpPr>
+      <p:grpSpPr>
+        <a:xfrm>
+          <a:off x="0" y="0"/>
+          <a:ext cx="0" cy="0"/>
+          <a:chOff x="0" y="0"/>
+          <a:chExt cx="0" cy="0"/>
+        </a:xfrm>
+      </p:grpSpPr>
+      <p:sp>
+        <p:nvSpPr>
+          <p:cNvPr id="3" name="Content Placeholder 2"/>
+          <p:cNvSpPr>
+            <a:spLocks noGrp="1"/>
+          </p:cNvSpPr>
+          <p:nvPr>
+            <p:ph idx="1"/>
+          </p:nvPr>
+        </p:nvSpPr>
+        <p:spPr/>
+        <p:txBody>
+          <a:bodyPr/>
+          <a:lstStyle/>
+          <a:p>
+            <a:r>
+              <a:rPr lang="en-US" dirty="0" smtClean="0">
+                <a:solidFill>
+                  <a:srgbClr val="FF0000"/>
+                </a:solidFill>
+              </a:rPr>
+              <a:t>We provide citrate synthase activity, which is functional. It is not possible for us to complete </a:t>
+            </a:r>
+            <a:r>
+              <a:rPr lang="en-US" dirty="0" err="1" smtClean="0">
+                <a:solidFill>
+                  <a:srgbClr val="FF0000"/>
+                </a:solidFill>
+              </a:rPr>
+              <a:t>respirometry</a:t>
+            </a:r>
+            <a:r>
+              <a:rPr lang="en-US" dirty="0" smtClean="0">
+                <a:solidFill>
+                  <a:srgbClr val="FF0000"/>
+                </a:solidFill>
+              </a:rPr>
+              <a:t> experiments without repeating the study in an entirely new cohort of mice.</a:t>
+            </a:r>
+          </a:p>
+          <a:p>
+            <a:endParaRPr lang="en-US" dirty="0">
+              <a:solidFill>
+                <a:srgbClr val="FF0000"/>
+              </a:solidFill>
+            </a:endParaRPr>
+          </a:p>
+          <a:p>
+            <a:endParaRPr lang="en-US" dirty="0">
+              <a:solidFill>
+                <a:srgbClr val="FF0000"/>
+              </a:solidFill>
+            </a:endParaRPr>
+          </a:p>
+        </p:txBody>
+      </p:sp>
+      <p:sp>
+        <p:nvSpPr>
+          <p:cNvPr id="4" name="Title 1"/>
+          <p:cNvSpPr>
+            <a:spLocks noGrp="1"/>
+          </p:cNvSpPr>
+          <p:nvPr>
+            <p:ph type="title"/>
+          </p:nvPr>
+        </p:nvSpPr>
+        <p:spPr>
+          <a:xfrm>
+            <a:off x="838200" y="365125"/>
+            <a:ext cx="10515600" cy="1325563"/>
+          </a:xfrm>
+        </p:spPr>
+        <p:txBody>
+          <a:bodyPr>
+            <a:normAutofit/>
+          </a:bodyPr>
+          <a:lstStyle/>
+          <a:p>
+            <a:r>
+              <a:rPr lang="en-US" dirty="0" smtClean="0"/>
               <a:t>Reviewer #3</a:t>
             </a:r>
             <a:br>
@@ -8027,7 +9206,7 @@
 </p:sld>
 </file>
 
-<file path=ppt/slides/slide14.xml><?xml version="1.0" encoding="utf-8"?>
+<file path=ppt/slides/slide15.xml><?xml version="1.0" encoding="utf-8"?>
 <p:sld xmlns:a="http://schemas.openxmlformats.org/drawingml/2006/main" xmlns:r="http://schemas.openxmlformats.org/officeDocument/2006/relationships" xmlns:p="http://schemas.openxmlformats.org/presentationml/2006/main">
   <p:cSld>
     <p:spTree>
@@ -8471,160 +9650,6 @@
 </p:sld>
 </file>
 
-<file path=ppt/slides/slide15.xml><?xml version="1.0" encoding="utf-8"?>
-<p:sld xmlns:a="http://schemas.openxmlformats.org/drawingml/2006/main" xmlns:r="http://schemas.openxmlformats.org/officeDocument/2006/relationships" xmlns:p="http://schemas.openxmlformats.org/presentationml/2006/main">
-  <p:cSld>
-    <p:spTree>
-      <p:nvGrpSpPr>
-        <p:cNvPr id="1" name=""/>
-        <p:cNvGrpSpPr/>
-        <p:nvPr/>
-      </p:nvGrpSpPr>
-      <p:grpSpPr>
-        <a:xfrm>
-          <a:off x="0" y="0"/>
-          <a:ext cx="0" cy="0"/>
-          <a:chOff x="0" y="0"/>
-          <a:chExt cx="0" cy="0"/>
-        </a:xfrm>
-      </p:grpSpPr>
-      <p:sp>
-        <p:nvSpPr>
-          <p:cNvPr id="3" name="Content Placeholder 2"/>
-          <p:cNvSpPr>
-            <a:spLocks noGrp="1"/>
-          </p:cNvSpPr>
-          <p:nvPr>
-            <p:ph idx="1"/>
-          </p:nvPr>
-        </p:nvSpPr>
-        <p:spPr/>
-        <p:txBody>
-          <a:bodyPr/>
-          <a:lstStyle/>
-          <a:p>
-            <a:r>
-              <a:rPr lang="en-US" dirty="0" smtClean="0">
-                <a:solidFill>
-                  <a:srgbClr val="FF0000"/>
-                </a:solidFill>
-              </a:rPr>
-              <a:t>Our newly included transcriptional data (see slide for reviewer #1) indicates that the reduction in </a:t>
-            </a:r>
-            <a:r>
-              <a:rPr lang="en-US" dirty="0" err="1" smtClean="0">
-                <a:solidFill>
-                  <a:srgbClr val="FF0000"/>
-                </a:solidFill>
-              </a:rPr>
-              <a:t>mtDNA</a:t>
-            </a:r>
-            <a:r>
-              <a:rPr lang="en-US" dirty="0" smtClean="0">
-                <a:solidFill>
-                  <a:srgbClr val="FF0000"/>
-                </a:solidFill>
-              </a:rPr>
-              <a:t> is downstream of mitochondrial biogenesis signaling and we propose that there are posttranslational modifications that cause the reduced citrate synthase activity (such as </a:t>
-            </a:r>
-            <a:r>
-              <a:rPr lang="en-US" dirty="0" err="1" smtClean="0">
-                <a:solidFill>
-                  <a:srgbClr val="FF0000"/>
-                </a:solidFill>
-              </a:rPr>
-              <a:t>glutathionylation</a:t>
-            </a:r>
-            <a:r>
-              <a:rPr lang="en-US" dirty="0" smtClean="0">
-                <a:solidFill>
-                  <a:srgbClr val="FF0000"/>
-                </a:solidFill>
-              </a:rPr>
-              <a:t>) and/or damage to the </a:t>
-            </a:r>
-            <a:r>
-              <a:rPr lang="en-US" dirty="0" err="1" smtClean="0">
-                <a:solidFill>
-                  <a:srgbClr val="FF0000"/>
-                </a:solidFill>
-              </a:rPr>
-              <a:t>mtDNA</a:t>
-            </a:r>
-            <a:r>
-              <a:rPr lang="en-US" dirty="0" smtClean="0">
-                <a:solidFill>
-                  <a:srgbClr val="FF0000"/>
-                </a:solidFill>
-              </a:rPr>
-              <a:t> (such as from oxidative stress). </a:t>
-            </a:r>
-            <a:endParaRPr lang="en-US" dirty="0">
-              <a:solidFill>
-                <a:srgbClr val="FF0000"/>
-              </a:solidFill>
-            </a:endParaRPr>
-          </a:p>
-        </p:txBody>
-      </p:sp>
-      <p:sp>
-        <p:nvSpPr>
-          <p:cNvPr id="4" name="Title 1"/>
-          <p:cNvSpPr>
-            <a:spLocks noGrp="1"/>
-          </p:cNvSpPr>
-          <p:nvPr>
-            <p:ph type="title"/>
-          </p:nvPr>
-        </p:nvSpPr>
-        <p:spPr>
-          <a:xfrm>
-            <a:off x="838200" y="365125"/>
-            <a:ext cx="10515600" cy="1325563"/>
-          </a:xfrm>
-        </p:spPr>
-        <p:txBody>
-          <a:bodyPr>
-            <a:normAutofit fontScale="90000"/>
-          </a:bodyPr>
-          <a:lstStyle/>
-          <a:p>
-            <a:r>
-              <a:rPr lang="en-US" dirty="0" smtClean="0"/>
-              <a:t>Reviewer #3</a:t>
-            </a:r>
-            <a:br>
-              <a:rPr lang="en-US" dirty="0" smtClean="0"/>
-            </a:br>
-            <a:r>
-              <a:rPr lang="en-US" sz="2000" dirty="0" smtClean="0"/>
-              <a:t>“Also, there is a disconnect between the </a:t>
-            </a:r>
-            <a:r>
-              <a:rPr lang="en-US" sz="2000" dirty="0" err="1" smtClean="0"/>
-              <a:t>mtDNA</a:t>
-            </a:r>
-            <a:r>
-              <a:rPr lang="en-US" sz="2000" dirty="0" smtClean="0"/>
-              <a:t> results and the results obtained using the OXPHOS antibody with no clear explanation over why this may have occurred. Functional data or EM imaging likely would clear this up.” </a:t>
-            </a:r>
-            <a:endParaRPr lang="en-US" dirty="0"/>
-          </a:p>
-        </p:txBody>
-      </p:sp>
-    </p:spTree>
-    <p:extLst>
-      <p:ext uri="{BB962C8B-B14F-4D97-AF65-F5344CB8AC3E}">
-        <p14:creationId xmlns:p14="http://schemas.microsoft.com/office/powerpoint/2010/main" val="716778166"/>
-      </p:ext>
-    </p:extLst>
-  </p:cSld>
-  <p:clrMapOvr>
-    <a:masterClrMapping/>
-  </p:clrMapOvr>
-</p:sld>
-</file>
-
 <file path=ppt/slides/slide16.xml><?xml version="1.0" encoding="utf-8"?>
 <p:sld xmlns:a="http://schemas.openxmlformats.org/drawingml/2006/main" xmlns:r="http://schemas.openxmlformats.org/officeDocument/2006/relationships" xmlns:p="http://schemas.openxmlformats.org/presentationml/2006/main">
   <p:cSld>
@@ -8663,6 +9688,160 @@
                   <a:srgbClr val="FF0000"/>
                 </a:solidFill>
               </a:rPr>
+              <a:t>Our newly included transcriptional data (see slide for reviewer #1) indicates that the reduction in </a:t>
+            </a:r>
+            <a:r>
+              <a:rPr lang="en-US" dirty="0" err="1" smtClean="0">
+                <a:solidFill>
+                  <a:srgbClr val="FF0000"/>
+                </a:solidFill>
+              </a:rPr>
+              <a:t>mtDNA</a:t>
+            </a:r>
+            <a:r>
+              <a:rPr lang="en-US" dirty="0" smtClean="0">
+                <a:solidFill>
+                  <a:srgbClr val="FF0000"/>
+                </a:solidFill>
+              </a:rPr>
+              <a:t> is downstream of mitochondrial biogenesis signaling and we propose that there are posttranslational modifications that cause the reduced citrate synthase activity (such as </a:t>
+            </a:r>
+            <a:r>
+              <a:rPr lang="en-US" dirty="0" err="1" smtClean="0">
+                <a:solidFill>
+                  <a:srgbClr val="FF0000"/>
+                </a:solidFill>
+              </a:rPr>
+              <a:t>glutathionylation</a:t>
+            </a:r>
+            <a:r>
+              <a:rPr lang="en-US" dirty="0" smtClean="0">
+                <a:solidFill>
+                  <a:srgbClr val="FF0000"/>
+                </a:solidFill>
+              </a:rPr>
+              <a:t>) and/or damage to the </a:t>
+            </a:r>
+            <a:r>
+              <a:rPr lang="en-US" dirty="0" err="1" smtClean="0">
+                <a:solidFill>
+                  <a:srgbClr val="FF0000"/>
+                </a:solidFill>
+              </a:rPr>
+              <a:t>mtDNA</a:t>
+            </a:r>
+            <a:r>
+              <a:rPr lang="en-US" dirty="0" smtClean="0">
+                <a:solidFill>
+                  <a:srgbClr val="FF0000"/>
+                </a:solidFill>
+              </a:rPr>
+              <a:t> (such as from oxidative stress). </a:t>
+            </a:r>
+            <a:endParaRPr lang="en-US" dirty="0">
+              <a:solidFill>
+                <a:srgbClr val="FF0000"/>
+              </a:solidFill>
+            </a:endParaRPr>
+          </a:p>
+        </p:txBody>
+      </p:sp>
+      <p:sp>
+        <p:nvSpPr>
+          <p:cNvPr id="4" name="Title 1"/>
+          <p:cNvSpPr>
+            <a:spLocks noGrp="1"/>
+          </p:cNvSpPr>
+          <p:nvPr>
+            <p:ph type="title"/>
+          </p:nvPr>
+        </p:nvSpPr>
+        <p:spPr>
+          <a:xfrm>
+            <a:off x="838200" y="365125"/>
+            <a:ext cx="10515600" cy="1325563"/>
+          </a:xfrm>
+        </p:spPr>
+        <p:txBody>
+          <a:bodyPr>
+            <a:normAutofit fontScale="90000"/>
+          </a:bodyPr>
+          <a:lstStyle/>
+          <a:p>
+            <a:r>
+              <a:rPr lang="en-US" dirty="0" smtClean="0"/>
+              <a:t>Reviewer #3</a:t>
+            </a:r>
+            <a:br>
+              <a:rPr lang="en-US" dirty="0" smtClean="0"/>
+            </a:br>
+            <a:r>
+              <a:rPr lang="en-US" sz="2000" dirty="0" smtClean="0"/>
+              <a:t>“Also, there is a disconnect between the </a:t>
+            </a:r>
+            <a:r>
+              <a:rPr lang="en-US" sz="2000" dirty="0" err="1" smtClean="0"/>
+              <a:t>mtDNA</a:t>
+            </a:r>
+            <a:r>
+              <a:rPr lang="en-US" sz="2000" dirty="0" smtClean="0"/>
+              <a:t> results and the results obtained using the OXPHOS antibody with no clear explanation over why this may have occurred. Functional data or EM imaging likely would clear this up.” </a:t>
+            </a:r>
+            <a:endParaRPr lang="en-US" dirty="0"/>
+          </a:p>
+        </p:txBody>
+      </p:sp>
+    </p:spTree>
+    <p:extLst>
+      <p:ext uri="{BB962C8B-B14F-4D97-AF65-F5344CB8AC3E}">
+        <p14:creationId xmlns:p14="http://schemas.microsoft.com/office/powerpoint/2010/main" val="716778166"/>
+      </p:ext>
+    </p:extLst>
+  </p:cSld>
+  <p:clrMapOvr>
+    <a:masterClrMapping/>
+  </p:clrMapOvr>
+</p:sld>
+</file>
+
+<file path=ppt/slides/slide17.xml><?xml version="1.0" encoding="utf-8"?>
+<p:sld xmlns:a="http://schemas.openxmlformats.org/drawingml/2006/main" xmlns:r="http://schemas.openxmlformats.org/officeDocument/2006/relationships" xmlns:p="http://schemas.openxmlformats.org/presentationml/2006/main">
+  <p:cSld>
+    <p:spTree>
+      <p:nvGrpSpPr>
+        <p:cNvPr id="1" name=""/>
+        <p:cNvGrpSpPr/>
+        <p:nvPr/>
+      </p:nvGrpSpPr>
+      <p:grpSpPr>
+        <a:xfrm>
+          <a:off x="0" y="0"/>
+          <a:ext cx="0" cy="0"/>
+          <a:chOff x="0" y="0"/>
+          <a:chExt cx="0" cy="0"/>
+        </a:xfrm>
+      </p:grpSpPr>
+      <p:sp>
+        <p:nvSpPr>
+          <p:cNvPr id="3" name="Content Placeholder 2"/>
+          <p:cNvSpPr>
+            <a:spLocks noGrp="1"/>
+          </p:cNvSpPr>
+          <p:nvPr>
+            <p:ph idx="1"/>
+          </p:nvPr>
+        </p:nvSpPr>
+        <p:spPr/>
+        <p:txBody>
+          <a:bodyPr/>
+          <a:lstStyle/>
+          <a:p>
+            <a:r>
+              <a:rPr lang="en-US" dirty="0" smtClean="0">
+                <a:solidFill>
+                  <a:srgbClr val="FF0000"/>
+                </a:solidFill>
+              </a:rPr>
               <a:t>We are already underway (kind of) using a SOD2 TG mouse model to address this question. However, it is beyond the scope of the current paper.</a:t>
             </a:r>
             <a:endParaRPr lang="en-US" dirty="0">
@@ -8723,7 +9902,7 @@
 </p:sld>
 </file>
 
-<file path=ppt/slides/slide17.xml><?xml version="1.0" encoding="utf-8"?>
+<file path=ppt/slides/slide18.xml><?xml version="1.0" encoding="utf-8"?>
 <p:sld xmlns:a="http://schemas.openxmlformats.org/drawingml/2006/main" xmlns:r="http://schemas.openxmlformats.org/officeDocument/2006/relationships" xmlns:p="http://schemas.openxmlformats.org/presentationml/2006/main">
   <p:cSld>
     <p:spTree>
@@ -9313,92 +10492,6 @@
           </a:p>
         </p:txBody>
       </p:sp>
-      <p:graphicFrame>
-        <p:nvGraphicFramePr>
-          <p:cNvPr id="26" name="Chart 25"/>
-          <p:cNvGraphicFramePr>
-            <a:graphicFrameLocks/>
-          </p:cNvGraphicFramePr>
-          <p:nvPr>
-            <p:extLst>
-              <p:ext uri="{D42A27DB-BD31-4B8C-83A1-F6EECF244321}">
-                <p14:modId xmlns:p14="http://schemas.microsoft.com/office/powerpoint/2010/main" val="81618837"/>
-              </p:ext>
-            </p:extLst>
-          </p:nvPr>
-        </p:nvGraphicFramePr>
-        <p:xfrm>
-          <a:off x="1862664" y="1650935"/>
-          <a:ext cx="4690530" cy="3095352"/>
-        </p:xfrm>
-        <a:graphic>
-          <a:graphicData uri="http://schemas.openxmlformats.org/drawingml/2006/chart">
-            <c:chart xmlns:c="http://schemas.openxmlformats.org/drawingml/2006/chart" xmlns:r="http://schemas.openxmlformats.org/officeDocument/2006/relationships" r:id="rId2"/>
-          </a:graphicData>
-        </a:graphic>
-      </p:graphicFrame>
-      <p:sp>
-        <p:nvSpPr>
-          <p:cNvPr id="27" name="TextBox 26"/>
-          <p:cNvSpPr txBox="1"/>
-          <p:nvPr/>
-        </p:nvSpPr>
-        <p:spPr>
-          <a:xfrm>
-            <a:off x="2671023" y="2034153"/>
-            <a:ext cx="648225" cy="246221"/>
-          </a:xfrm>
-          <a:prstGeom prst="rect">
-            <a:avLst/>
-          </a:prstGeom>
-          <a:noFill/>
-        </p:spPr>
-        <p:txBody>
-          <a:bodyPr wrap="square" rtlCol="0">
-            <a:spAutoFit/>
-          </a:bodyPr>
-          <a:lstStyle/>
-          <a:p>
-            <a:pPr algn="ctr"/>
-            <a:r>
-              <a:rPr lang="en-US" sz="1000" dirty="0" smtClean="0"/>
-              <a:t>p=0.074</a:t>
-            </a:r>
-            <a:endParaRPr lang="en-US" sz="1000" dirty="0"/>
-          </a:p>
-        </p:txBody>
-      </p:sp>
-      <p:sp>
-        <p:nvSpPr>
-          <p:cNvPr id="28" name="TextBox 27"/>
-          <p:cNvSpPr txBox="1"/>
-          <p:nvPr/>
-        </p:nvSpPr>
-        <p:spPr>
-          <a:xfrm>
-            <a:off x="3390369" y="2675327"/>
-            <a:ext cx="648225" cy="246221"/>
-          </a:xfrm>
-          <a:prstGeom prst="rect">
-            <a:avLst/>
-          </a:prstGeom>
-          <a:noFill/>
-        </p:spPr>
-        <p:txBody>
-          <a:bodyPr wrap="square" rtlCol="0">
-            <a:spAutoFit/>
-          </a:bodyPr>
-          <a:lstStyle/>
-          <a:p>
-            <a:pPr algn="ctr"/>
-            <a:r>
-              <a:rPr lang="en-US" sz="1000" dirty="0" smtClean="0"/>
-              <a:t>p=0.119</a:t>
-            </a:r>
-            <a:endParaRPr lang="en-US" sz="1000" dirty="0"/>
-          </a:p>
-        </p:txBody>
-      </p:sp>
       <p:pic>
         <p:nvPicPr>
           <p:cNvPr id="29" name="Picture 28"/>
@@ -9408,7 +10501,7 @@
           <p:nvPr/>
         </p:nvPicPr>
         <p:blipFill>
-          <a:blip r:embed="rId3"/>
+          <a:blip r:embed="rId2"/>
           <a:stretch>
             <a:fillRect/>
           </a:stretch>
@@ -9432,7 +10525,7 @@
           <p:nvPr/>
         </p:nvPicPr>
         <p:blipFill>
-          <a:blip r:embed="rId4">
+          <a:blip r:embed="rId3">
             <a:extLst>
               <a:ext uri="{28A0092B-C50C-407E-A947-70E740481C1C}">
                 <a14:useLocalDpi xmlns:a14="http://schemas.microsoft.com/office/drawing/2010/main" val="0"/>
@@ -9508,6 +10601,30 @@
           </a:p>
         </p:txBody>
       </p:sp>
+      <p:graphicFrame>
+        <p:nvGraphicFramePr>
+          <p:cNvPr id="9" name="Chart 8"/>
+          <p:cNvGraphicFramePr>
+            <a:graphicFrameLocks/>
+          </p:cNvGraphicFramePr>
+          <p:nvPr>
+            <p:extLst>
+              <p:ext uri="{D42A27DB-BD31-4B8C-83A1-F6EECF244321}">
+                <p14:modId xmlns:p14="http://schemas.microsoft.com/office/powerpoint/2010/main" val="463746573"/>
+              </p:ext>
+            </p:extLst>
+          </p:nvPr>
+        </p:nvGraphicFramePr>
+        <p:xfrm>
+          <a:off x="1142323" y="1690687"/>
+          <a:ext cx="5888672" cy="3289085"/>
+        </p:xfrm>
+        <a:graphic>
+          <a:graphicData uri="http://schemas.openxmlformats.org/drawingml/2006/chart">
+            <c:chart xmlns:c="http://schemas.openxmlformats.org/drawingml/2006/chart" xmlns:r="http://schemas.openxmlformats.org/officeDocument/2006/relationships" r:id="rId4"/>
+          </a:graphicData>
+        </a:graphic>
+      </p:graphicFrame>
     </p:spTree>
     <p:extLst>
       <p:ext uri="{BB962C8B-B14F-4D97-AF65-F5344CB8AC3E}">
@@ -9879,13 +10996,24 @@
                   <a:srgbClr val="FF0000"/>
                 </a:solidFill>
               </a:rPr>
-              <a:t>We thought we had the CLAMS data for the mice post-HFD, but now we are not so sure. We need to look through dates to see if this data is available. If so, Dave to analyze it. </a:t>
-            </a:r>
-            <a:endParaRPr lang="en-US" dirty="0">
-              <a:solidFill>
-                <a:srgbClr val="FF0000"/>
-              </a:solidFill>
-            </a:endParaRPr>
+              <a:t>We thought we had the CLAMS data for the mice post-HFD, but it appears that we don’t. This could be a problem if reviewer #2 insists </a:t>
+            </a:r>
+            <a:r>
+              <a:rPr lang="en-US" smtClean="0">
+                <a:solidFill>
+                  <a:srgbClr val="FF0000"/>
+                </a:solidFill>
+              </a:rPr>
+              <a:t>on its </a:t>
+            </a:r>
+            <a:r>
+              <a:rPr lang="en-US" dirty="0" smtClean="0">
+                <a:solidFill>
+                  <a:srgbClr val="FF0000"/>
+                </a:solidFill>
+              </a:rPr>
+              <a:t>inclusion.</a:t>
+            </a:r>
           </a:p>
         </p:txBody>
       </p:sp>
@@ -10058,30 +11186,6 @@
           </a:p>
         </p:txBody>
       </p:sp>
-      <p:graphicFrame>
-        <p:nvGraphicFramePr>
-          <p:cNvPr id="5" name="Chart 4"/>
-          <p:cNvGraphicFramePr>
-            <a:graphicFrameLocks/>
-          </p:cNvGraphicFramePr>
-          <p:nvPr>
-            <p:extLst>
-              <p:ext uri="{D42A27DB-BD31-4B8C-83A1-F6EECF244321}">
-                <p14:modId xmlns:p14="http://schemas.microsoft.com/office/powerpoint/2010/main" val="3198094003"/>
-              </p:ext>
-            </p:extLst>
-          </p:nvPr>
-        </p:nvGraphicFramePr>
-        <p:xfrm>
-          <a:off x="321725" y="3516511"/>
-          <a:ext cx="5274733" cy="3031065"/>
-        </p:xfrm>
-        <a:graphic>
-          <a:graphicData uri="http://schemas.openxmlformats.org/drawingml/2006/chart">
-            <c:chart xmlns:c="http://schemas.openxmlformats.org/drawingml/2006/chart" xmlns:r="http://schemas.openxmlformats.org/officeDocument/2006/relationships" r:id="rId2"/>
-          </a:graphicData>
-        </a:graphic>
-      </p:graphicFrame>
       <p:sp>
         <p:nvSpPr>
           <p:cNvPr id="6" name="TextBox 5"/>
@@ -10185,7 +11289,7 @@
             <a:pPr algn="ctr"/>
             <a:r>
               <a:rPr lang="en-US" sz="1000" dirty="0" smtClean="0"/>
-              <a:t>p=0.221</a:t>
+              <a:t>p=0.131</a:t>
             </a:r>
             <a:endParaRPr lang="en-US" sz="1000" dirty="0"/>
           </a:p>
@@ -10200,7 +11304,7 @@
         <p:spPr>
           <a:xfrm>
             <a:off x="5776127" y="3273041"/>
-            <a:ext cx="3647281" cy="3293209"/>
+            <a:ext cx="3647281" cy="2554545"/>
           </a:xfrm>
           <a:prstGeom prst="rect">
             <a:avLst/>
@@ -10232,7 +11336,15 @@
             </a:r>
             <a:r>
               <a:rPr lang="en-US" sz="1600" dirty="0" smtClean="0"/>
-              <a:t> mechanisms in muscle may also be elevated, arguing against a reduction in uncoupling as driving the lower energy expenditure in the MCP230 exposed mice.</a:t>
+              <a:t> mechanisms in muscle may also be affected (</a:t>
+            </a:r>
+            <a:r>
+              <a:rPr lang="en-US" sz="1600" dirty="0" err="1" smtClean="0"/>
+              <a:t>Sln</a:t>
+            </a:r>
+            <a:r>
+              <a:rPr lang="en-US" sz="1600" dirty="0" smtClean="0"/>
+              <a:t>/Serca1)</a:t>
             </a:r>
             <a:endParaRPr lang="en-US" sz="1600" dirty="0"/>
           </a:p>
@@ -10258,7 +11370,7 @@
         </p:xfrm>
         <a:graphic>
           <a:graphicData uri="http://schemas.openxmlformats.org/drawingml/2006/chart">
-            <c:chart xmlns:c="http://schemas.openxmlformats.org/drawingml/2006/chart" xmlns:r="http://schemas.openxmlformats.org/officeDocument/2006/relationships" r:id="rId3"/>
+            <c:chart xmlns:c="http://schemas.openxmlformats.org/drawingml/2006/chart" xmlns:r="http://schemas.openxmlformats.org/officeDocument/2006/relationships" r:id="rId2"/>
           </a:graphicData>
         </a:graphic>
       </p:graphicFrame>
@@ -10313,6 +11425,61 @@
               <a:t> (p=0.08, n=8-13)</a:t>
             </a:r>
             <a:endParaRPr lang="en-US" sz="1600" dirty="0"/>
+          </a:p>
+        </p:txBody>
+      </p:sp>
+      <p:graphicFrame>
+        <p:nvGraphicFramePr>
+          <p:cNvPr id="13" name="Chart 12"/>
+          <p:cNvGraphicFramePr>
+            <a:graphicFrameLocks/>
+          </p:cNvGraphicFramePr>
+          <p:nvPr>
+            <p:extLst>
+              <p:ext uri="{D42A27DB-BD31-4B8C-83A1-F6EECF244321}">
+                <p14:modId xmlns:p14="http://schemas.microsoft.com/office/powerpoint/2010/main" val="2910912896"/>
+              </p:ext>
+            </p:extLst>
+          </p:nvPr>
+        </p:nvGraphicFramePr>
+        <p:xfrm>
+          <a:off x="330178" y="3253079"/>
+          <a:ext cx="5266279" cy="3219530"/>
+        </p:xfrm>
+        <a:graphic>
+          <a:graphicData uri="http://schemas.openxmlformats.org/drawingml/2006/chart">
+            <c:chart xmlns:c="http://schemas.openxmlformats.org/drawingml/2006/chart" xmlns:r="http://schemas.openxmlformats.org/officeDocument/2006/relationships" r:id="rId3"/>
+          </a:graphicData>
+        </a:graphic>
+      </p:graphicFrame>
+      <p:sp>
+        <p:nvSpPr>
+          <p:cNvPr id="14" name="TextBox 13"/>
+          <p:cNvSpPr txBox="1"/>
+          <p:nvPr/>
+        </p:nvSpPr>
+        <p:spPr>
+          <a:xfrm>
+            <a:off x="2847458" y="6472608"/>
+            <a:ext cx="635252" cy="246221"/>
+          </a:xfrm>
+          <a:prstGeom prst="rect">
+            <a:avLst/>
+          </a:prstGeom>
+          <a:noFill/>
+        </p:spPr>
+        <p:txBody>
+          <a:bodyPr wrap="square" rtlCol="0">
+            <a:spAutoFit/>
+          </a:bodyPr>
+          <a:lstStyle/>
+          <a:p>
+            <a:pPr algn="ctr"/>
+            <a:r>
+              <a:rPr lang="en-US" sz="1000" dirty="0" smtClean="0"/>
+              <a:t>p=0.151</a:t>
+            </a:r>
+            <a:endParaRPr lang="en-US" sz="1000" dirty="0"/>
           </a:p>
         </p:txBody>
       </p:sp>

</xml_diff>